<commit_message>
Adding the square pattern
</commit_message>
<xml_diff>
--- a/Resources/Python patterns.pptx
+++ b/Resources/Python patterns.pptx
@@ -6231,13 +6231,7 @@
               <a:rPr lang="en-IN" dirty="0" smtClean="0">
                 <a:latin typeface="Avenir LT Std 45 Book" panose="020B0502020203020204" pitchFamily="34" charset="0"/>
               </a:rPr>
-              <a:t>Print the Square pattern with * </a:t>
-            </a:r>
-            <a:r>
-              <a:rPr lang="en-IN" dirty="0" smtClean="0">
-                <a:latin typeface="Avenir LT Std 45 Book" panose="020B0502020203020204" pitchFamily="34" charset="0"/>
-              </a:rPr>
-              <a:t>symbol.</a:t>
+              <a:t>Print the Square pattern with * symbol.</a:t>
             </a:r>
           </a:p>
           <a:p>
@@ -6257,9 +6251,6 @@
               </a:rPr>
               <a:t>input number.</a:t>
             </a:r>
-            <a:endParaRPr lang="en-IN" dirty="0" smtClean="0">
-              <a:latin typeface="Avenir LT Std 45 Book" panose="020B0502020203020204" pitchFamily="34" charset="0"/>
-            </a:endParaRPr>
           </a:p>
           <a:p>
             <a:pPr marL="457200" indent="-457200">
@@ -6312,8 +6303,29 @@
               <a:rPr lang="en-IN" dirty="0" smtClean="0">
                 <a:latin typeface="Avenir LT Std 45 Book" panose="020B0502020203020204" pitchFamily="34" charset="0"/>
               </a:rPr>
-              <a:t>Print the Square pattern with alphabet symbol. </a:t>
-            </a:r>
+              <a:t>Print the Square pattern </a:t>
+            </a:r>
+            <a:r>
+              <a:rPr lang="en-IN" dirty="0" smtClean="0">
+                <a:latin typeface="Avenir LT Std 45 Book" panose="020B0502020203020204" pitchFamily="34" charset="0"/>
+              </a:rPr>
+              <a:t>with fixed </a:t>
+            </a:r>
+            <a:r>
+              <a:rPr lang="en-IN" dirty="0" smtClean="0">
+                <a:latin typeface="Avenir LT Std 45 Book" panose="020B0502020203020204" pitchFamily="34" charset="0"/>
+              </a:rPr>
+              <a:t>alphabet </a:t>
+            </a:r>
+            <a:r>
+              <a:rPr lang="en-IN" dirty="0" smtClean="0">
+                <a:latin typeface="Avenir LT Std 45 Book" panose="020B0502020203020204" pitchFamily="34" charset="0"/>
+              </a:rPr>
+              <a:t>symbol in every row. </a:t>
+            </a:r>
+            <a:endParaRPr lang="en-IN" dirty="0" smtClean="0">
+              <a:latin typeface="Avenir LT Std 45 Book" panose="020B0502020203020204" pitchFamily="34" charset="0"/>
+            </a:endParaRPr>
           </a:p>
           <a:p>
             <a:pPr marL="457200" indent="-457200">
@@ -6324,8 +6336,119 @@
               <a:rPr lang="en-IN" dirty="0" smtClean="0">
                 <a:latin typeface="Avenir LT Std 45 Book" panose="020B0502020203020204" pitchFamily="34" charset="0"/>
               </a:rPr>
-              <a:t>Print the Square pattern with digits.</a:t>
-            </a:r>
+              <a:t>Print the Square pattern with digits</a:t>
+            </a:r>
+            <a:r>
+              <a:rPr lang="en-IN" dirty="0" smtClean="0">
+                <a:latin typeface="Avenir LT Std 45 Book" panose="020B0502020203020204" pitchFamily="34" charset="0"/>
+              </a:rPr>
+              <a:t>.</a:t>
+            </a:r>
+          </a:p>
+          <a:p>
+            <a:pPr marL="457200" indent="-457200">
+              <a:buFont typeface="Wingdings 3" charset="2"/>
+              <a:buAutoNum type="arabicPeriod"/>
+            </a:pPr>
+            <a:r>
+              <a:rPr lang="en-IN" dirty="0">
+                <a:latin typeface="Avenir LT Std 45 Book" panose="020B0502020203020204" pitchFamily="34" charset="0"/>
+              </a:rPr>
+              <a:t>Print the Square pattern with fixed alphabet symbol in every </a:t>
+            </a:r>
+            <a:r>
+              <a:rPr lang="en-IN" dirty="0" smtClean="0">
+                <a:latin typeface="Avenir LT Std 45 Book" panose="020B0502020203020204" pitchFamily="34" charset="0"/>
+              </a:rPr>
+              <a:t>column.</a:t>
+            </a:r>
+          </a:p>
+          <a:p>
+            <a:pPr marL="457200" indent="-457200">
+              <a:buFont typeface="Wingdings 3" charset="2"/>
+              <a:buAutoNum type="arabicPeriod"/>
+            </a:pPr>
+            <a:r>
+              <a:rPr lang="en-IN" dirty="0">
+                <a:latin typeface="Avenir LT Std 45 Book" panose="020B0502020203020204" pitchFamily="34" charset="0"/>
+              </a:rPr>
+              <a:t>Print the Square pattern with </a:t>
+            </a:r>
+            <a:r>
+              <a:rPr lang="en-IN" dirty="0" smtClean="0">
+                <a:latin typeface="Avenir LT Std 45 Book" panose="020B0502020203020204" pitchFamily="34" charset="0"/>
+              </a:rPr>
+              <a:t>digits in descending order. </a:t>
+            </a:r>
+          </a:p>
+          <a:p>
+            <a:pPr marL="457200" indent="-457200">
+              <a:buFont typeface="Wingdings 3" charset="2"/>
+              <a:buAutoNum type="arabicPeriod"/>
+            </a:pPr>
+            <a:r>
+              <a:rPr lang="en-IN" dirty="0">
+                <a:latin typeface="Avenir LT Std 45 Book" panose="020B0502020203020204" pitchFamily="34" charset="0"/>
+              </a:rPr>
+              <a:t>Print the Square pattern with </a:t>
+            </a:r>
+            <a:r>
+              <a:rPr lang="en-IN" dirty="0" smtClean="0">
+                <a:latin typeface="Avenir LT Std 45 Book" panose="020B0502020203020204" pitchFamily="34" charset="0"/>
+              </a:rPr>
+              <a:t>alphabets </a:t>
+            </a:r>
+            <a:r>
+              <a:rPr lang="en-IN">
+                <a:latin typeface="Avenir LT Std 45 Book" panose="020B0502020203020204" pitchFamily="34" charset="0"/>
+              </a:rPr>
+              <a:t>in </a:t>
+            </a:r>
+            <a:r>
+              <a:rPr lang="en-IN" smtClean="0">
+                <a:latin typeface="Avenir LT Std 45 Book" panose="020B0502020203020204" pitchFamily="34" charset="0"/>
+              </a:rPr>
+              <a:t>reverse </a:t>
+            </a:r>
+            <a:r>
+              <a:rPr lang="en-IN" dirty="0">
+                <a:latin typeface="Avenir LT Std 45 Book" panose="020B0502020203020204" pitchFamily="34" charset="0"/>
+              </a:rPr>
+              <a:t>order. </a:t>
+            </a:r>
+          </a:p>
+          <a:p>
+            <a:pPr marL="457200" indent="-457200">
+              <a:buFont typeface="Wingdings 3" charset="2"/>
+              <a:buAutoNum type="arabicPeriod"/>
+            </a:pPr>
+            <a:endParaRPr lang="en-IN" dirty="0" smtClean="0">
+              <a:latin typeface="Avenir LT Std 45 Book" panose="020B0502020203020204" pitchFamily="34" charset="0"/>
+            </a:endParaRPr>
+          </a:p>
+          <a:p>
+            <a:pPr marL="457200" indent="-457200">
+              <a:buFont typeface="Wingdings 3" charset="2"/>
+              <a:buAutoNum type="arabicPeriod"/>
+            </a:pPr>
+            <a:endParaRPr lang="en-IN" dirty="0">
+              <a:latin typeface="Avenir LT Std 45 Book" panose="020B0502020203020204" pitchFamily="34" charset="0"/>
+            </a:endParaRPr>
+          </a:p>
+          <a:p>
+            <a:pPr marL="457200" indent="-457200">
+              <a:buFont typeface="Wingdings 3" charset="2"/>
+              <a:buAutoNum type="arabicPeriod"/>
+            </a:pPr>
+            <a:endParaRPr lang="en-IN" dirty="0" smtClean="0">
+              <a:latin typeface="Avenir LT Std 45 Book" panose="020B0502020203020204" pitchFamily="34" charset="0"/>
+            </a:endParaRPr>
+          </a:p>
+          <a:p>
+            <a:pPr marL="457200" indent="-457200">
+              <a:buFont typeface="Wingdings 3" charset="2"/>
+              <a:buAutoNum type="arabicPeriod"/>
+            </a:pPr>
             <a:endParaRPr lang="en-IN" dirty="0">
               <a:latin typeface="Avenir LT Std 45 Book" panose="020B0502020203020204" pitchFamily="34" charset="0"/>
             </a:endParaRPr>

</xml_diff>

<commit_message>
Hollow Diamond Pattern with Star symbol
</commit_message>
<xml_diff>
--- a/Resources/Python patterns.pptx
+++ b/Resources/Python patterns.pptx
@@ -7,6 +7,12 @@
   <p:sldIdLst>
     <p:sldId id="256" r:id="rId2"/>
     <p:sldId id="257" r:id="rId3"/>
+    <p:sldId id="258" r:id="rId4"/>
+    <p:sldId id="259" r:id="rId5"/>
+    <p:sldId id="260" r:id="rId6"/>
+    <p:sldId id="261" r:id="rId7"/>
+    <p:sldId id="263" r:id="rId8"/>
+    <p:sldId id="262" r:id="rId9"/>
   </p:sldIdLst>
   <p:sldSz cx="12192000" cy="6858000"/>
   <p:notesSz cx="6858000" cy="9144000"/>
@@ -299,7 +305,7 @@
           <a:p>
             <a:fld id="{48D89C24-D857-404F-AB50-A8E6ABCFE2AD}" type="datetimeFigureOut">
               <a:rPr lang="en-IN" smtClean="0"/>
-              <a:t>28-11-2021</a:t>
+              <a:t>15-10-2022</a:t>
             </a:fld>
             <a:endParaRPr lang="en-IN"/>
           </a:p>
@@ -574,7 +580,7 @@
           <a:p>
             <a:fld id="{48D89C24-D857-404F-AB50-A8E6ABCFE2AD}" type="datetimeFigureOut">
               <a:rPr lang="en-IN" smtClean="0"/>
-              <a:t>28-11-2021</a:t>
+              <a:t>15-10-2022</a:t>
             </a:fld>
             <a:endParaRPr lang="en-IN"/>
           </a:p>
@@ -768,7 +774,7 @@
           <a:p>
             <a:fld id="{48D89C24-D857-404F-AB50-A8E6ABCFE2AD}" type="datetimeFigureOut">
               <a:rPr lang="en-IN" smtClean="0"/>
-              <a:t>28-11-2021</a:t>
+              <a:t>15-10-2022</a:t>
             </a:fld>
             <a:endParaRPr lang="en-IN"/>
           </a:p>
@@ -1041,7 +1047,7 @@
           <a:p>
             <a:fld id="{48D89C24-D857-404F-AB50-A8E6ABCFE2AD}" type="datetimeFigureOut">
               <a:rPr lang="en-IN" smtClean="0"/>
-              <a:t>28-11-2021</a:t>
+              <a:t>15-10-2022</a:t>
             </a:fld>
             <a:endParaRPr lang="en-IN"/>
           </a:p>
@@ -1382,7 +1388,7 @@
           <a:p>
             <a:fld id="{48D89C24-D857-404F-AB50-A8E6ABCFE2AD}" type="datetimeFigureOut">
               <a:rPr lang="en-IN" smtClean="0"/>
-              <a:t>28-11-2021</a:t>
+              <a:t>15-10-2022</a:t>
             </a:fld>
             <a:endParaRPr lang="en-IN"/>
           </a:p>
@@ -2005,7 +2011,7 @@
           <a:p>
             <a:fld id="{48D89C24-D857-404F-AB50-A8E6ABCFE2AD}" type="datetimeFigureOut">
               <a:rPr lang="en-IN" smtClean="0"/>
-              <a:t>28-11-2021</a:t>
+              <a:t>15-10-2022</a:t>
             </a:fld>
             <a:endParaRPr lang="en-IN"/>
           </a:p>
@@ -2865,7 +2871,7 @@
           <a:p>
             <a:fld id="{48D89C24-D857-404F-AB50-A8E6ABCFE2AD}" type="datetimeFigureOut">
               <a:rPr lang="en-IN" smtClean="0"/>
-              <a:t>28-11-2021</a:t>
+              <a:t>15-10-2022</a:t>
             </a:fld>
             <a:endParaRPr lang="en-IN"/>
           </a:p>
@@ -3035,7 +3041,7 @@
           <a:p>
             <a:fld id="{48D89C24-D857-404F-AB50-A8E6ABCFE2AD}" type="datetimeFigureOut">
               <a:rPr lang="en-IN" smtClean="0"/>
-              <a:t>28-11-2021</a:t>
+              <a:t>15-10-2022</a:t>
             </a:fld>
             <a:endParaRPr lang="en-IN"/>
           </a:p>
@@ -3215,7 +3221,7 @@
           <a:p>
             <a:fld id="{48D89C24-D857-404F-AB50-A8E6ABCFE2AD}" type="datetimeFigureOut">
               <a:rPr lang="en-IN" smtClean="0"/>
-              <a:t>28-11-2021</a:t>
+              <a:t>15-10-2022</a:t>
             </a:fld>
             <a:endParaRPr lang="en-IN"/>
           </a:p>
@@ -3385,7 +3391,7 @@
           <a:p>
             <a:fld id="{48D89C24-D857-404F-AB50-A8E6ABCFE2AD}" type="datetimeFigureOut">
               <a:rPr lang="en-IN" smtClean="0"/>
-              <a:t>28-11-2021</a:t>
+              <a:t>15-10-2022</a:t>
             </a:fld>
             <a:endParaRPr lang="en-IN"/>
           </a:p>
@@ -3632,7 +3638,7 @@
           <a:p>
             <a:fld id="{48D89C24-D857-404F-AB50-A8E6ABCFE2AD}" type="datetimeFigureOut">
               <a:rPr lang="en-IN" smtClean="0"/>
-              <a:t>28-11-2021</a:t>
+              <a:t>15-10-2022</a:t>
             </a:fld>
             <a:endParaRPr lang="en-IN"/>
           </a:p>
@@ -3924,7 +3930,7 @@
           <a:p>
             <a:fld id="{48D89C24-D857-404F-AB50-A8E6ABCFE2AD}" type="datetimeFigureOut">
               <a:rPr lang="en-IN" smtClean="0"/>
-              <a:t>28-11-2021</a:t>
+              <a:t>15-10-2022</a:t>
             </a:fld>
             <a:endParaRPr lang="en-IN"/>
           </a:p>
@@ -4368,7 +4374,7 @@
           <a:p>
             <a:fld id="{48D89C24-D857-404F-AB50-A8E6ABCFE2AD}" type="datetimeFigureOut">
               <a:rPr lang="en-IN" smtClean="0"/>
-              <a:t>28-11-2021</a:t>
+              <a:t>15-10-2022</a:t>
             </a:fld>
             <a:endParaRPr lang="en-IN"/>
           </a:p>
@@ -4486,7 +4492,7 @@
           <a:p>
             <a:fld id="{48D89C24-D857-404F-AB50-A8E6ABCFE2AD}" type="datetimeFigureOut">
               <a:rPr lang="en-IN" smtClean="0"/>
-              <a:t>28-11-2021</a:t>
+              <a:t>15-10-2022</a:t>
             </a:fld>
             <a:endParaRPr lang="en-IN"/>
           </a:p>
@@ -4581,7 +4587,7 @@
           <a:p>
             <a:fld id="{48D89C24-D857-404F-AB50-A8E6ABCFE2AD}" type="datetimeFigureOut">
               <a:rPr lang="en-IN" smtClean="0"/>
-              <a:t>28-11-2021</a:t>
+              <a:t>15-10-2022</a:t>
             </a:fld>
             <a:endParaRPr lang="en-IN"/>
           </a:p>
@@ -4860,7 +4866,7 @@
           <a:p>
             <a:fld id="{48D89C24-D857-404F-AB50-A8E6ABCFE2AD}" type="datetimeFigureOut">
               <a:rPr lang="en-IN" smtClean="0"/>
-              <a:t>28-11-2021</a:t>
+              <a:t>15-10-2022</a:t>
             </a:fld>
             <a:endParaRPr lang="en-IN"/>
           </a:p>
@@ -5135,7 +5141,7 @@
           <a:p>
             <a:fld id="{48D89C24-D857-404F-AB50-A8E6ABCFE2AD}" type="datetimeFigureOut">
               <a:rPr lang="en-IN" smtClean="0"/>
-              <a:t>28-11-2021</a:t>
+              <a:t>15-10-2022</a:t>
             </a:fld>
             <a:endParaRPr lang="en-IN"/>
           </a:p>
@@ -5564,7 +5570,7 @@
           <a:p>
             <a:fld id="{48D89C24-D857-404F-AB50-A8E6ABCFE2AD}" type="datetimeFigureOut">
               <a:rPr lang="en-IN" smtClean="0"/>
-              <a:t>28-11-2021</a:t>
+              <a:t>15-10-2022</a:t>
             </a:fld>
             <a:endParaRPr lang="en-IN"/>
           </a:p>
@@ -6303,109 +6309,82 @@
               <a:rPr lang="en-IN" dirty="0" smtClean="0">
                 <a:latin typeface="Avenir LT Std 45 Book" panose="020B0502020203020204" pitchFamily="34" charset="0"/>
               </a:rPr>
-              <a:t>Print the Square pattern </a:t>
-            </a:r>
+              <a:t>Print the Square pattern with fixed alphabet symbol in every row. </a:t>
+            </a:r>
+          </a:p>
+          <a:p>
+            <a:pPr marL="457200" indent="-457200">
+              <a:buFont typeface="Wingdings 3" charset="2"/>
+              <a:buAutoNum type="arabicPeriod"/>
+            </a:pPr>
             <a:r>
               <a:rPr lang="en-IN" dirty="0" smtClean="0">
                 <a:latin typeface="Avenir LT Std 45 Book" panose="020B0502020203020204" pitchFamily="34" charset="0"/>
               </a:rPr>
-              <a:t>with fixed </a:t>
+              <a:t>Print the Square pattern with digits.</a:t>
+            </a:r>
+          </a:p>
+          <a:p>
+            <a:pPr marL="457200" indent="-457200">
+              <a:buFont typeface="Wingdings 3" charset="2"/>
+              <a:buAutoNum type="arabicPeriod"/>
+            </a:pPr>
+            <a:r>
+              <a:rPr lang="en-IN" dirty="0">
+                <a:latin typeface="Avenir LT Std 45 Book" panose="020B0502020203020204" pitchFamily="34" charset="0"/>
+              </a:rPr>
+              <a:t>Print the Square pattern with fixed alphabet symbol in every </a:t>
             </a:r>
             <a:r>
               <a:rPr lang="en-IN" dirty="0" smtClean="0">
                 <a:latin typeface="Avenir LT Std 45 Book" panose="020B0502020203020204" pitchFamily="34" charset="0"/>
               </a:rPr>
-              <a:t>alphabet </a:t>
+              <a:t>column.</a:t>
+            </a:r>
+          </a:p>
+          <a:p>
+            <a:pPr marL="457200" indent="-457200">
+              <a:buFont typeface="Wingdings 3" charset="2"/>
+              <a:buAutoNum type="arabicPeriod"/>
+            </a:pPr>
+            <a:r>
+              <a:rPr lang="en-IN" dirty="0">
+                <a:latin typeface="Avenir LT Std 45 Book" panose="020B0502020203020204" pitchFamily="34" charset="0"/>
+              </a:rPr>
+              <a:t>Print the Square pattern with </a:t>
             </a:r>
             <a:r>
               <a:rPr lang="en-IN" dirty="0" smtClean="0">
                 <a:latin typeface="Avenir LT Std 45 Book" panose="020B0502020203020204" pitchFamily="34" charset="0"/>
               </a:rPr>
-              <a:t>symbol in every row. </a:t>
-            </a:r>
-            <a:endParaRPr lang="en-IN" dirty="0" smtClean="0">
-              <a:latin typeface="Avenir LT Std 45 Book" panose="020B0502020203020204" pitchFamily="34" charset="0"/>
-            </a:endParaRPr>
+              <a:t>digits in descending order. </a:t>
+            </a:r>
           </a:p>
           <a:p>
             <a:pPr marL="457200" indent="-457200">
               <a:buFont typeface="Wingdings 3" charset="2"/>
               <a:buAutoNum type="arabicPeriod"/>
             </a:pPr>
+            <a:r>
+              <a:rPr lang="en-IN" dirty="0">
+                <a:latin typeface="Avenir LT Std 45 Book" panose="020B0502020203020204" pitchFamily="34" charset="0"/>
+              </a:rPr>
+              <a:t>Print the Square pattern with </a:t>
+            </a:r>
             <a:r>
               <a:rPr lang="en-IN" dirty="0" smtClean="0">
                 <a:latin typeface="Avenir LT Std 45 Book" panose="020B0502020203020204" pitchFamily="34" charset="0"/>
               </a:rPr>
-              <a:t>Print the Square pattern with digits</a:t>
-            </a:r>
-            <a:r>
-              <a:rPr lang="en-IN" dirty="0" smtClean="0">
-                <a:latin typeface="Avenir LT Std 45 Book" panose="020B0502020203020204" pitchFamily="34" charset="0"/>
-              </a:rPr>
-              <a:t>.</a:t>
-            </a:r>
-          </a:p>
-          <a:p>
-            <a:pPr marL="457200" indent="-457200">
-              <a:buFont typeface="Wingdings 3" charset="2"/>
-              <a:buAutoNum type="arabicPeriod"/>
-            </a:pPr>
+              <a:t>alphabets </a:t>
+            </a:r>
             <a:r>
               <a:rPr lang="en-IN" dirty="0">
                 <a:latin typeface="Avenir LT Std 45 Book" panose="020B0502020203020204" pitchFamily="34" charset="0"/>
               </a:rPr>
-              <a:t>Print the Square pattern with fixed alphabet symbol in every </a:t>
+              <a:t>in </a:t>
             </a:r>
             <a:r>
               <a:rPr lang="en-IN" dirty="0" smtClean="0">
-                <a:latin typeface="Avenir LT Std 45 Book" panose="020B0502020203020204" pitchFamily="34" charset="0"/>
-              </a:rPr>
-              <a:t>column.</a:t>
-            </a:r>
-          </a:p>
-          <a:p>
-            <a:pPr marL="457200" indent="-457200">
-              <a:buFont typeface="Wingdings 3" charset="2"/>
-              <a:buAutoNum type="arabicPeriod"/>
-            </a:pPr>
-            <a:r>
-              <a:rPr lang="en-IN" dirty="0">
-                <a:latin typeface="Avenir LT Std 45 Book" panose="020B0502020203020204" pitchFamily="34" charset="0"/>
-              </a:rPr>
-              <a:t>Print the Square pattern with </a:t>
-            </a:r>
-            <a:r>
-              <a:rPr lang="en-IN" dirty="0" smtClean="0">
-                <a:latin typeface="Avenir LT Std 45 Book" panose="020B0502020203020204" pitchFamily="34" charset="0"/>
-              </a:rPr>
-              <a:t>digits in descending order. </a:t>
-            </a:r>
-          </a:p>
-          <a:p>
-            <a:pPr marL="457200" indent="-457200">
-              <a:buFont typeface="Wingdings 3" charset="2"/>
-              <a:buAutoNum type="arabicPeriod"/>
-            </a:pPr>
-            <a:r>
-              <a:rPr lang="en-IN" dirty="0">
-                <a:latin typeface="Avenir LT Std 45 Book" panose="020B0502020203020204" pitchFamily="34" charset="0"/>
-              </a:rPr>
-              <a:t>Print the Square pattern with </a:t>
-            </a:r>
-            <a:r>
-              <a:rPr lang="en-IN" dirty="0" smtClean="0">
-                <a:latin typeface="Avenir LT Std 45 Book" panose="020B0502020203020204" pitchFamily="34" charset="0"/>
-              </a:rPr>
-              <a:t>alphabets </a:t>
-            </a:r>
-            <a:r>
-              <a:rPr lang="en-IN">
-                <a:latin typeface="Avenir LT Std 45 Book" panose="020B0502020203020204" pitchFamily="34" charset="0"/>
-              </a:rPr>
-              <a:t>in </a:t>
-            </a:r>
-            <a:r>
-              <a:rPr lang="en-IN" smtClean="0">
                 <a:latin typeface="Avenir LT Std 45 Book" panose="020B0502020203020204" pitchFamily="34" charset="0"/>
               </a:rPr>
               <a:t>reverse </a:t>
@@ -6467,6 +6446,1749 @@
     <p:extLst>
       <p:ext uri="{BB962C8B-B14F-4D97-AF65-F5344CB8AC3E}">
         <p14:creationId xmlns:p14="http://schemas.microsoft.com/office/powerpoint/2010/main" val="1598987178"/>
+      </p:ext>
+    </p:extLst>
+  </p:cSld>
+  <p:clrMapOvr>
+    <a:masterClrMapping/>
+  </p:clrMapOvr>
+</p:sld>
+</file>
+
+<file path=ppt/slides/slide3.xml><?xml version="1.0" encoding="utf-8"?>
+<p:sld xmlns:a="http://schemas.openxmlformats.org/drawingml/2006/main" xmlns:r="http://schemas.openxmlformats.org/officeDocument/2006/relationships" xmlns:p="http://schemas.openxmlformats.org/presentationml/2006/main">
+  <p:cSld>
+    <p:spTree>
+      <p:nvGrpSpPr>
+        <p:cNvPr id="1" name=""/>
+        <p:cNvGrpSpPr/>
+        <p:nvPr/>
+      </p:nvGrpSpPr>
+      <p:grpSpPr>
+        <a:xfrm>
+          <a:off x="0" y="0"/>
+          <a:ext cx="0" cy="0"/>
+          <a:chOff x="0" y="0"/>
+          <a:chExt cx="0" cy="0"/>
+        </a:xfrm>
+      </p:grpSpPr>
+      <p:sp>
+        <p:nvSpPr>
+          <p:cNvPr id="2" name="Title 1"/>
+          <p:cNvSpPr>
+            <a:spLocks noGrp="1"/>
+          </p:cNvSpPr>
+          <p:nvPr>
+            <p:ph type="title"/>
+          </p:nvPr>
+        </p:nvSpPr>
+        <p:spPr>
+          <a:xfrm>
+            <a:off x="710515" y="331573"/>
+            <a:ext cx="10489080" cy="669324"/>
+          </a:xfrm>
+        </p:spPr>
+        <p:txBody>
+          <a:bodyPr>
+            <a:normAutofit fontScale="90000"/>
+          </a:bodyPr>
+          <a:lstStyle/>
+          <a:p>
+            <a:pPr algn="l"/>
+            <a:r>
+              <a:rPr lang="en-IN" b="0" dirty="0" smtClean="0">
+                <a:latin typeface="Avenir LT Std 65 Medium" panose="020B0803020203020204" pitchFamily="34" charset="0"/>
+              </a:rPr>
+              <a:t>Pyramid patterns</a:t>
+            </a:r>
+            <a:endParaRPr lang="en-IN" b="0" dirty="0">
+              <a:latin typeface="Avenir LT Std 65 Medium" panose="020B0803020203020204" pitchFamily="34" charset="0"/>
+            </a:endParaRPr>
+          </a:p>
+        </p:txBody>
+      </p:sp>
+      <p:sp>
+        <p:nvSpPr>
+          <p:cNvPr id="3" name="Content Placeholder 2"/>
+          <p:cNvSpPr>
+            <a:spLocks noGrp="1"/>
+          </p:cNvSpPr>
+          <p:nvPr>
+            <p:ph idx="1"/>
+          </p:nvPr>
+        </p:nvSpPr>
+        <p:spPr>
+          <a:xfrm>
+            <a:off x="864973" y="1136822"/>
+            <a:ext cx="10972800" cy="5362832"/>
+          </a:xfrm>
+        </p:spPr>
+        <p:txBody>
+          <a:bodyPr>
+            <a:normAutofit/>
+          </a:bodyPr>
+          <a:lstStyle/>
+          <a:p>
+            <a:pPr marL="457200" indent="-457200">
+              <a:buAutoNum type="arabicPeriod"/>
+            </a:pPr>
+            <a:r>
+              <a:rPr lang="en-IN" dirty="0" smtClean="0">
+                <a:latin typeface="Avenir LT Std 45 Book" panose="020B0502020203020204" pitchFamily="34" charset="0"/>
+              </a:rPr>
+              <a:t>Print Pyramid with * symbol.</a:t>
+            </a:r>
+          </a:p>
+          <a:p>
+            <a:pPr marL="457200" indent="-457200">
+              <a:buFont typeface="Wingdings 3" charset="2"/>
+              <a:buAutoNum type="arabicPeriod"/>
+            </a:pPr>
+            <a:r>
+              <a:rPr lang="en-IN" dirty="0">
+                <a:latin typeface="Avenir LT Std 45 Book" panose="020B0502020203020204" pitchFamily="34" charset="0"/>
+              </a:rPr>
+              <a:t>Print Pyramid with </a:t>
+            </a:r>
+            <a:r>
+              <a:rPr lang="en-IN" dirty="0" smtClean="0">
+                <a:latin typeface="Avenir LT Std 45 Book" panose="020B0502020203020204" pitchFamily="34" charset="0"/>
+              </a:rPr>
+              <a:t>fixed numerical digit in every row.</a:t>
+            </a:r>
+          </a:p>
+          <a:p>
+            <a:pPr marL="457200" indent="-457200">
+              <a:buFont typeface="Wingdings 3" charset="2"/>
+              <a:buAutoNum type="arabicPeriod"/>
+            </a:pPr>
+            <a:r>
+              <a:rPr lang="en-IN" dirty="0" smtClean="0">
+                <a:latin typeface="Avenir LT Std 45 Book" panose="020B0502020203020204" pitchFamily="34" charset="0"/>
+              </a:rPr>
+              <a:t>Print Pyramid with fixed alphabet symbol in every row.</a:t>
+            </a:r>
+          </a:p>
+          <a:p>
+            <a:pPr marL="457200" indent="-457200">
+              <a:buFont typeface="Wingdings 3" charset="2"/>
+              <a:buAutoNum type="arabicPeriod"/>
+            </a:pPr>
+            <a:r>
+              <a:rPr lang="en-IN" dirty="0" smtClean="0">
+                <a:latin typeface="Avenir LT Std 45 Book" panose="020B0502020203020204" pitchFamily="34" charset="0"/>
+              </a:rPr>
+              <a:t>Print Pyramid with digit and alphabet in ascending order.</a:t>
+            </a:r>
+          </a:p>
+          <a:p>
+            <a:pPr marL="457200" indent="-457200">
+              <a:buFont typeface="Wingdings 3" charset="2"/>
+              <a:buAutoNum type="arabicPeriod"/>
+            </a:pPr>
+            <a:r>
+              <a:rPr lang="en-IN" dirty="0">
+                <a:latin typeface="Avenir LT Std 45 Book" panose="020B0502020203020204" pitchFamily="34" charset="0"/>
+              </a:rPr>
+              <a:t>Print Pyramid with digit and alphabet in </a:t>
+            </a:r>
+            <a:r>
+              <a:rPr lang="en-IN" dirty="0" smtClean="0">
+                <a:latin typeface="Avenir LT Std 45 Book" panose="020B0502020203020204" pitchFamily="34" charset="0"/>
+              </a:rPr>
+              <a:t>descending </a:t>
+            </a:r>
+            <a:r>
+              <a:rPr lang="en-IN" dirty="0">
+                <a:latin typeface="Avenir LT Std 45 Book" panose="020B0502020203020204" pitchFamily="34" charset="0"/>
+              </a:rPr>
+              <a:t>order.</a:t>
+            </a:r>
+          </a:p>
+          <a:p>
+            <a:pPr marL="457200" indent="-457200">
+              <a:buFont typeface="Wingdings 3" charset="2"/>
+              <a:buAutoNum type="arabicPeriod"/>
+            </a:pPr>
+            <a:endParaRPr lang="en-IN" dirty="0" smtClean="0">
+              <a:latin typeface="Avenir LT Std 45 Book" panose="020B0502020203020204" pitchFamily="34" charset="0"/>
+            </a:endParaRPr>
+          </a:p>
+          <a:p>
+            <a:pPr marL="457200" indent="-457200">
+              <a:buFont typeface="Wingdings 3" charset="2"/>
+              <a:buAutoNum type="arabicPeriod"/>
+            </a:pPr>
+            <a:endParaRPr lang="en-IN" dirty="0">
+              <a:latin typeface="Avenir LT Std 45 Book" panose="020B0502020203020204" pitchFamily="34" charset="0"/>
+            </a:endParaRPr>
+          </a:p>
+          <a:p>
+            <a:pPr marL="457200" indent="-457200">
+              <a:buAutoNum type="arabicPeriod"/>
+            </a:pPr>
+            <a:endParaRPr lang="en-IN" dirty="0" smtClean="0">
+              <a:latin typeface="Avenir LT Std 45 Book" panose="020B0502020203020204" pitchFamily="34" charset="0"/>
+            </a:endParaRPr>
+          </a:p>
+          <a:p>
+            <a:pPr marL="457200" indent="-457200">
+              <a:buAutoNum type="arabicPeriod"/>
+            </a:pPr>
+            <a:endParaRPr lang="en-IN" dirty="0" smtClean="0">
+              <a:latin typeface="Avenir LT Std 45 Book" panose="020B0502020203020204" pitchFamily="34" charset="0"/>
+            </a:endParaRPr>
+          </a:p>
+          <a:p>
+            <a:pPr marL="457200" indent="-457200">
+              <a:buFont typeface="Wingdings 3" charset="2"/>
+              <a:buAutoNum type="arabicPeriod"/>
+            </a:pPr>
+            <a:endParaRPr lang="en-IN" dirty="0" smtClean="0">
+              <a:latin typeface="Avenir LT Std 45 Book" panose="020B0502020203020204" pitchFamily="34" charset="0"/>
+            </a:endParaRPr>
+          </a:p>
+          <a:p>
+            <a:pPr marL="457200" indent="-457200">
+              <a:buFont typeface="Wingdings 3" charset="2"/>
+              <a:buAutoNum type="arabicPeriod"/>
+            </a:pPr>
+            <a:endParaRPr lang="en-IN" dirty="0">
+              <a:latin typeface="Avenir LT Std 45 Book" panose="020B0502020203020204" pitchFamily="34" charset="0"/>
+            </a:endParaRPr>
+          </a:p>
+          <a:p>
+            <a:pPr marL="457200" indent="-457200">
+              <a:buFont typeface="Wingdings 3" charset="2"/>
+              <a:buAutoNum type="arabicPeriod"/>
+            </a:pPr>
+            <a:endParaRPr lang="en-IN" dirty="0" smtClean="0">
+              <a:latin typeface="Avenir LT Std 45 Book" panose="020B0502020203020204" pitchFamily="34" charset="0"/>
+            </a:endParaRPr>
+          </a:p>
+          <a:p>
+            <a:pPr marL="457200" indent="-457200">
+              <a:buFont typeface="Wingdings 3" charset="2"/>
+              <a:buAutoNum type="arabicPeriod"/>
+            </a:pPr>
+            <a:endParaRPr lang="en-IN" dirty="0">
+              <a:latin typeface="Avenir LT Std 45 Book" panose="020B0502020203020204" pitchFamily="34" charset="0"/>
+            </a:endParaRPr>
+          </a:p>
+          <a:p>
+            <a:pPr marL="457200" indent="-457200">
+              <a:buAutoNum type="arabicPeriod"/>
+            </a:pPr>
+            <a:endParaRPr lang="en-IN" sz="1800" dirty="0">
+              <a:latin typeface="+mj-lt"/>
+            </a:endParaRPr>
+          </a:p>
+        </p:txBody>
+      </p:sp>
+    </p:spTree>
+    <p:extLst>
+      <p:ext uri="{BB962C8B-B14F-4D97-AF65-F5344CB8AC3E}">
+        <p14:creationId xmlns:p14="http://schemas.microsoft.com/office/powerpoint/2010/main" val="458553983"/>
+      </p:ext>
+    </p:extLst>
+  </p:cSld>
+  <p:clrMapOvr>
+    <a:masterClrMapping/>
+  </p:clrMapOvr>
+</p:sld>
+</file>
+
+<file path=ppt/slides/slide4.xml><?xml version="1.0" encoding="utf-8"?>
+<p:sld xmlns:a="http://schemas.openxmlformats.org/drawingml/2006/main" xmlns:r="http://schemas.openxmlformats.org/officeDocument/2006/relationships" xmlns:p="http://schemas.openxmlformats.org/presentationml/2006/main">
+  <p:cSld>
+    <p:spTree>
+      <p:nvGrpSpPr>
+        <p:cNvPr id="1" name=""/>
+        <p:cNvGrpSpPr/>
+        <p:nvPr/>
+      </p:nvGrpSpPr>
+      <p:grpSpPr>
+        <a:xfrm>
+          <a:off x="0" y="0"/>
+          <a:ext cx="0" cy="0"/>
+          <a:chOff x="0" y="0"/>
+          <a:chExt cx="0" cy="0"/>
+        </a:xfrm>
+      </p:grpSpPr>
+      <p:sp>
+        <p:nvSpPr>
+          <p:cNvPr id="2" name="Title 1"/>
+          <p:cNvSpPr>
+            <a:spLocks noGrp="1"/>
+          </p:cNvSpPr>
+          <p:nvPr>
+            <p:ph type="title"/>
+          </p:nvPr>
+        </p:nvSpPr>
+        <p:spPr>
+          <a:xfrm>
+            <a:off x="710515" y="331573"/>
+            <a:ext cx="10489080" cy="669324"/>
+          </a:xfrm>
+        </p:spPr>
+        <p:txBody>
+          <a:bodyPr>
+            <a:normAutofit fontScale="90000"/>
+          </a:bodyPr>
+          <a:lstStyle/>
+          <a:p>
+            <a:pPr algn="l"/>
+            <a:r>
+              <a:rPr lang="en-IN" b="0" dirty="0" smtClean="0">
+                <a:latin typeface="Avenir LT Std 65 Medium" panose="020B0803020203020204" pitchFamily="34" charset="0"/>
+              </a:rPr>
+              <a:t>Inverted Pyramid patterns</a:t>
+            </a:r>
+            <a:endParaRPr lang="en-IN" b="0" dirty="0">
+              <a:latin typeface="Avenir LT Std 65 Medium" panose="020B0803020203020204" pitchFamily="34" charset="0"/>
+            </a:endParaRPr>
+          </a:p>
+        </p:txBody>
+      </p:sp>
+      <p:sp>
+        <p:nvSpPr>
+          <p:cNvPr id="3" name="Content Placeholder 2"/>
+          <p:cNvSpPr>
+            <a:spLocks noGrp="1"/>
+          </p:cNvSpPr>
+          <p:nvPr>
+            <p:ph idx="1"/>
+          </p:nvPr>
+        </p:nvSpPr>
+        <p:spPr>
+          <a:xfrm>
+            <a:off x="864973" y="1136822"/>
+            <a:ext cx="10972800" cy="5362832"/>
+          </a:xfrm>
+        </p:spPr>
+        <p:txBody>
+          <a:bodyPr>
+            <a:normAutofit/>
+          </a:bodyPr>
+          <a:lstStyle/>
+          <a:p>
+            <a:pPr marL="457200" indent="-457200">
+              <a:buAutoNum type="arabicPeriod"/>
+            </a:pPr>
+            <a:r>
+              <a:rPr lang="en-IN" dirty="0" smtClean="0">
+                <a:latin typeface="Avenir LT Std 45 Book" panose="020B0502020203020204" pitchFamily="34" charset="0"/>
+              </a:rPr>
+              <a:t>Print Inverted Pyramid with * symbol.</a:t>
+            </a:r>
+          </a:p>
+          <a:p>
+            <a:pPr marL="457200" indent="-457200">
+              <a:buFont typeface="Wingdings 3" charset="2"/>
+              <a:buAutoNum type="arabicPeriod"/>
+            </a:pPr>
+            <a:r>
+              <a:rPr lang="en-IN" dirty="0">
+                <a:latin typeface="Avenir LT Std 45 Book" panose="020B0502020203020204" pitchFamily="34" charset="0"/>
+              </a:rPr>
+              <a:t>Print Inverted </a:t>
+            </a:r>
+            <a:r>
+              <a:rPr lang="en-IN" dirty="0" smtClean="0">
+                <a:latin typeface="Avenir LT Std 45 Book" panose="020B0502020203020204" pitchFamily="34" charset="0"/>
+              </a:rPr>
+              <a:t>Pyramid </a:t>
+            </a:r>
+            <a:r>
+              <a:rPr lang="en-IN" dirty="0">
+                <a:latin typeface="Avenir LT Std 45 Book" panose="020B0502020203020204" pitchFamily="34" charset="0"/>
+              </a:rPr>
+              <a:t>with </a:t>
+            </a:r>
+            <a:r>
+              <a:rPr lang="en-IN" dirty="0" smtClean="0">
+                <a:latin typeface="Avenir LT Std 45 Book" panose="020B0502020203020204" pitchFamily="34" charset="0"/>
+              </a:rPr>
+              <a:t>fixed numerical digit in every row.</a:t>
+            </a:r>
+          </a:p>
+          <a:p>
+            <a:pPr marL="457200" indent="-457200">
+              <a:buFont typeface="Wingdings 3" charset="2"/>
+              <a:buAutoNum type="arabicPeriod"/>
+            </a:pPr>
+            <a:r>
+              <a:rPr lang="en-IN" dirty="0" smtClean="0">
+                <a:latin typeface="Avenir LT Std 45 Book" panose="020B0502020203020204" pitchFamily="34" charset="0"/>
+              </a:rPr>
+              <a:t>Print Inverted Pyramid with fixed alphabet symbol in every row.</a:t>
+            </a:r>
+          </a:p>
+          <a:p>
+            <a:pPr marL="457200" indent="-457200">
+              <a:buFont typeface="Wingdings 3" charset="2"/>
+              <a:buAutoNum type="arabicPeriod"/>
+            </a:pPr>
+            <a:r>
+              <a:rPr lang="en-IN" dirty="0">
+                <a:latin typeface="Avenir LT Std 45 Book" panose="020B0502020203020204" pitchFamily="34" charset="0"/>
+              </a:rPr>
+              <a:t>Print Inverted Pyramid with </a:t>
+            </a:r>
+            <a:r>
+              <a:rPr lang="en-IN" dirty="0" smtClean="0">
+                <a:latin typeface="Avenir LT Std 45 Book" panose="020B0502020203020204" pitchFamily="34" charset="0"/>
+              </a:rPr>
+              <a:t>digits and alphabet </a:t>
+            </a:r>
+            <a:r>
+              <a:rPr lang="en-IN" dirty="0">
+                <a:latin typeface="Avenir LT Std 45 Book" panose="020B0502020203020204" pitchFamily="34" charset="0"/>
+              </a:rPr>
+              <a:t>symbol in </a:t>
+            </a:r>
+            <a:r>
+              <a:rPr lang="en-IN" dirty="0" smtClean="0">
+                <a:latin typeface="Avenir LT Std 45 Book" panose="020B0502020203020204" pitchFamily="34" charset="0"/>
+              </a:rPr>
+              <a:t>ascending order.</a:t>
+            </a:r>
+          </a:p>
+          <a:p>
+            <a:pPr marL="457200" indent="-457200">
+              <a:buFont typeface="Wingdings 3" charset="2"/>
+              <a:buAutoNum type="arabicPeriod"/>
+            </a:pPr>
+            <a:r>
+              <a:rPr lang="en-IN" dirty="0" smtClean="0">
+                <a:latin typeface="Avenir LT Std 45 Book" panose="020B0502020203020204" pitchFamily="34" charset="0"/>
+              </a:rPr>
+              <a:t>Print </a:t>
+            </a:r>
+            <a:r>
+              <a:rPr lang="en-IN" dirty="0">
+                <a:latin typeface="Avenir LT Std 45 Book" panose="020B0502020203020204" pitchFamily="34" charset="0"/>
+              </a:rPr>
+              <a:t>Inverted Pyramid with digits and alphabet symbol in </a:t>
+            </a:r>
+            <a:r>
+              <a:rPr lang="en-IN" dirty="0" smtClean="0">
+                <a:latin typeface="Avenir LT Std 45 Book" panose="020B0502020203020204" pitchFamily="34" charset="0"/>
+              </a:rPr>
+              <a:t>descending order.</a:t>
+            </a:r>
+            <a:endParaRPr lang="en-IN" dirty="0">
+              <a:latin typeface="Avenir LT Std 45 Book" panose="020B0502020203020204" pitchFamily="34" charset="0"/>
+            </a:endParaRPr>
+          </a:p>
+          <a:p>
+            <a:pPr marL="457200" indent="-457200">
+              <a:buFont typeface="Wingdings 3" charset="2"/>
+              <a:buAutoNum type="arabicPeriod"/>
+            </a:pPr>
+            <a:endParaRPr lang="en-IN" dirty="0" smtClean="0">
+              <a:latin typeface="Avenir LT Std 45 Book" panose="020B0502020203020204" pitchFamily="34" charset="0"/>
+            </a:endParaRPr>
+          </a:p>
+          <a:p>
+            <a:pPr marL="457200" indent="-457200">
+              <a:buFont typeface="Wingdings 3" charset="2"/>
+              <a:buAutoNum type="arabicPeriod"/>
+            </a:pPr>
+            <a:endParaRPr lang="en-IN" dirty="0">
+              <a:latin typeface="Avenir LT Std 45 Book" panose="020B0502020203020204" pitchFamily="34" charset="0"/>
+            </a:endParaRPr>
+          </a:p>
+          <a:p>
+            <a:pPr marL="457200" indent="-457200">
+              <a:buAutoNum type="arabicPeriod"/>
+            </a:pPr>
+            <a:endParaRPr lang="en-IN" dirty="0" smtClean="0">
+              <a:latin typeface="Avenir LT Std 45 Book" panose="020B0502020203020204" pitchFamily="34" charset="0"/>
+            </a:endParaRPr>
+          </a:p>
+          <a:p>
+            <a:pPr marL="457200" indent="-457200">
+              <a:buAutoNum type="arabicPeriod"/>
+            </a:pPr>
+            <a:endParaRPr lang="en-IN" dirty="0">
+              <a:latin typeface="Avenir LT Std 45 Book" panose="020B0502020203020204" pitchFamily="34" charset="0"/>
+            </a:endParaRPr>
+          </a:p>
+          <a:p>
+            <a:pPr marL="457200" indent="-457200">
+              <a:buAutoNum type="arabicPeriod"/>
+            </a:pPr>
+            <a:endParaRPr lang="en-IN" dirty="0" smtClean="0">
+              <a:latin typeface="Avenir LT Std 45 Book" panose="020B0502020203020204" pitchFamily="34" charset="0"/>
+            </a:endParaRPr>
+          </a:p>
+          <a:p>
+            <a:pPr marL="457200" indent="-457200">
+              <a:buAutoNum type="arabicPeriod"/>
+            </a:pPr>
+            <a:endParaRPr lang="en-IN" dirty="0" smtClean="0">
+              <a:latin typeface="Avenir LT Std 45 Book" panose="020B0502020203020204" pitchFamily="34" charset="0"/>
+            </a:endParaRPr>
+          </a:p>
+          <a:p>
+            <a:pPr marL="457200" indent="-457200">
+              <a:buFont typeface="Wingdings 3" charset="2"/>
+              <a:buAutoNum type="arabicPeriod"/>
+            </a:pPr>
+            <a:endParaRPr lang="en-IN" dirty="0" smtClean="0">
+              <a:latin typeface="Avenir LT Std 45 Book" panose="020B0502020203020204" pitchFamily="34" charset="0"/>
+            </a:endParaRPr>
+          </a:p>
+          <a:p>
+            <a:pPr marL="457200" indent="-457200">
+              <a:buFont typeface="Wingdings 3" charset="2"/>
+              <a:buAutoNum type="arabicPeriod"/>
+            </a:pPr>
+            <a:endParaRPr lang="en-IN" dirty="0">
+              <a:latin typeface="Avenir LT Std 45 Book" panose="020B0502020203020204" pitchFamily="34" charset="0"/>
+            </a:endParaRPr>
+          </a:p>
+          <a:p>
+            <a:pPr marL="457200" indent="-457200">
+              <a:buFont typeface="Wingdings 3" charset="2"/>
+              <a:buAutoNum type="arabicPeriod"/>
+            </a:pPr>
+            <a:endParaRPr lang="en-IN" dirty="0" smtClean="0">
+              <a:latin typeface="Avenir LT Std 45 Book" panose="020B0502020203020204" pitchFamily="34" charset="0"/>
+            </a:endParaRPr>
+          </a:p>
+          <a:p>
+            <a:pPr marL="457200" indent="-457200">
+              <a:buFont typeface="Wingdings 3" charset="2"/>
+              <a:buAutoNum type="arabicPeriod"/>
+            </a:pPr>
+            <a:endParaRPr lang="en-IN" dirty="0">
+              <a:latin typeface="Avenir LT Std 45 Book" panose="020B0502020203020204" pitchFamily="34" charset="0"/>
+            </a:endParaRPr>
+          </a:p>
+          <a:p>
+            <a:pPr marL="457200" indent="-457200">
+              <a:buAutoNum type="arabicPeriod"/>
+            </a:pPr>
+            <a:endParaRPr lang="en-IN" sz="1800" dirty="0">
+              <a:latin typeface="+mj-lt"/>
+            </a:endParaRPr>
+          </a:p>
+        </p:txBody>
+      </p:sp>
+    </p:spTree>
+    <p:extLst>
+      <p:ext uri="{BB962C8B-B14F-4D97-AF65-F5344CB8AC3E}">
+        <p14:creationId xmlns:p14="http://schemas.microsoft.com/office/powerpoint/2010/main" val="1447327438"/>
+      </p:ext>
+    </p:extLst>
+  </p:cSld>
+  <p:clrMapOvr>
+    <a:masterClrMapping/>
+  </p:clrMapOvr>
+</p:sld>
+</file>
+
+<file path=ppt/slides/slide5.xml><?xml version="1.0" encoding="utf-8"?>
+<p:sld xmlns:a="http://schemas.openxmlformats.org/drawingml/2006/main" xmlns:r="http://schemas.openxmlformats.org/officeDocument/2006/relationships" xmlns:p="http://schemas.openxmlformats.org/presentationml/2006/main">
+  <p:cSld>
+    <p:spTree>
+      <p:nvGrpSpPr>
+        <p:cNvPr id="1" name=""/>
+        <p:cNvGrpSpPr/>
+        <p:nvPr/>
+      </p:nvGrpSpPr>
+      <p:grpSpPr>
+        <a:xfrm>
+          <a:off x="0" y="0"/>
+          <a:ext cx="0" cy="0"/>
+          <a:chOff x="0" y="0"/>
+          <a:chExt cx="0" cy="0"/>
+        </a:xfrm>
+      </p:grpSpPr>
+      <p:sp>
+        <p:nvSpPr>
+          <p:cNvPr id="2" name="Title 1"/>
+          <p:cNvSpPr>
+            <a:spLocks noGrp="1"/>
+          </p:cNvSpPr>
+          <p:nvPr>
+            <p:ph type="title"/>
+          </p:nvPr>
+        </p:nvSpPr>
+        <p:spPr>
+          <a:xfrm>
+            <a:off x="710515" y="331573"/>
+            <a:ext cx="10489080" cy="669324"/>
+          </a:xfrm>
+        </p:spPr>
+        <p:txBody>
+          <a:bodyPr>
+            <a:normAutofit fontScale="90000"/>
+          </a:bodyPr>
+          <a:lstStyle/>
+          <a:p>
+            <a:pPr algn="l"/>
+            <a:r>
+              <a:rPr lang="en-IN" b="0" dirty="0" smtClean="0">
+                <a:latin typeface="Avenir LT Std 65 Medium" panose="020B0803020203020204" pitchFamily="34" charset="0"/>
+              </a:rPr>
+              <a:t>Right Angle Triangle patterns</a:t>
+            </a:r>
+            <a:endParaRPr lang="en-IN" b="0" dirty="0">
+              <a:latin typeface="Avenir LT Std 65 Medium" panose="020B0803020203020204" pitchFamily="34" charset="0"/>
+            </a:endParaRPr>
+          </a:p>
+        </p:txBody>
+      </p:sp>
+      <p:sp>
+        <p:nvSpPr>
+          <p:cNvPr id="3" name="Content Placeholder 2"/>
+          <p:cNvSpPr>
+            <a:spLocks noGrp="1"/>
+          </p:cNvSpPr>
+          <p:nvPr>
+            <p:ph idx="1"/>
+          </p:nvPr>
+        </p:nvSpPr>
+        <p:spPr>
+          <a:xfrm>
+            <a:off x="864973" y="1136822"/>
+            <a:ext cx="10972800" cy="5362832"/>
+          </a:xfrm>
+        </p:spPr>
+        <p:txBody>
+          <a:bodyPr>
+            <a:normAutofit/>
+          </a:bodyPr>
+          <a:lstStyle/>
+          <a:p>
+            <a:pPr marL="457200" indent="-457200">
+              <a:buAutoNum type="arabicPeriod"/>
+            </a:pPr>
+            <a:r>
+              <a:rPr lang="en-IN" dirty="0" smtClean="0">
+                <a:latin typeface="Avenir LT Std 45 Book" panose="020B0502020203020204" pitchFamily="34" charset="0"/>
+              </a:rPr>
+              <a:t>Print Right </a:t>
+            </a:r>
+            <a:r>
+              <a:rPr lang="en-IN" dirty="0">
+                <a:latin typeface="Avenir LT Std 45 Book" panose="020B0502020203020204" pitchFamily="34" charset="0"/>
+              </a:rPr>
+              <a:t>A</a:t>
+            </a:r>
+            <a:r>
+              <a:rPr lang="en-IN" dirty="0" smtClean="0">
+                <a:latin typeface="Avenir LT Std 45 Book" panose="020B0502020203020204" pitchFamily="34" charset="0"/>
+              </a:rPr>
+              <a:t>ngle Triangle with * symbol ,fixed numerical and alphabet symbol in every row.</a:t>
+            </a:r>
+          </a:p>
+          <a:p>
+            <a:pPr marL="457200" indent="-457200">
+              <a:buFont typeface="Wingdings 3" charset="2"/>
+              <a:buAutoNum type="arabicPeriod"/>
+            </a:pPr>
+            <a:r>
+              <a:rPr lang="en-IN" dirty="0" smtClean="0">
+                <a:latin typeface="Avenir LT Std 45 Book" panose="020B0502020203020204" pitchFamily="34" charset="0"/>
+              </a:rPr>
+              <a:t>Print </a:t>
+            </a:r>
+            <a:r>
+              <a:rPr lang="en-IN" dirty="0">
+                <a:latin typeface="Avenir LT Std 45 Book" panose="020B0502020203020204" pitchFamily="34" charset="0"/>
+              </a:rPr>
+              <a:t>Right Angle Triangle with </a:t>
+            </a:r>
+            <a:r>
+              <a:rPr lang="en-IN" dirty="0" smtClean="0">
+                <a:latin typeface="Avenir LT Std 45 Book" panose="020B0502020203020204" pitchFamily="34" charset="0"/>
+              </a:rPr>
+              <a:t>numbers </a:t>
+            </a:r>
+            <a:r>
+              <a:rPr lang="en-IN" dirty="0">
+                <a:latin typeface="Avenir LT Std 45 Book" panose="020B0502020203020204" pitchFamily="34" charset="0"/>
+              </a:rPr>
+              <a:t>and alphabet </a:t>
+            </a:r>
+            <a:r>
+              <a:rPr lang="en-IN" dirty="0" smtClean="0">
+                <a:latin typeface="Avenir LT Std 45 Book" panose="020B0502020203020204" pitchFamily="34" charset="0"/>
+              </a:rPr>
+              <a:t>in ascending order.</a:t>
+            </a:r>
+            <a:endParaRPr lang="en-IN" dirty="0">
+              <a:latin typeface="Avenir LT Std 45 Book" panose="020B0502020203020204" pitchFamily="34" charset="0"/>
+            </a:endParaRPr>
+          </a:p>
+          <a:p>
+            <a:pPr marL="457200" indent="-457200">
+              <a:buFont typeface="Wingdings 3" charset="2"/>
+              <a:buAutoNum type="arabicPeriod"/>
+            </a:pPr>
+            <a:r>
+              <a:rPr lang="en-IN" dirty="0">
+                <a:latin typeface="Avenir LT Std 45 Book" panose="020B0502020203020204" pitchFamily="34" charset="0"/>
+              </a:rPr>
+              <a:t>Print Right Angle Triangle with numbers and alphabet </a:t>
+            </a:r>
+            <a:r>
+              <a:rPr lang="en-IN" dirty="0" smtClean="0">
+                <a:latin typeface="Avenir LT Std 45 Book" panose="020B0502020203020204" pitchFamily="34" charset="0"/>
+              </a:rPr>
+              <a:t>in descending </a:t>
+            </a:r>
+            <a:r>
+              <a:rPr lang="en-IN" dirty="0">
+                <a:latin typeface="Avenir LT Std 45 Book" panose="020B0502020203020204" pitchFamily="34" charset="0"/>
+              </a:rPr>
+              <a:t>order.</a:t>
+            </a:r>
+          </a:p>
+          <a:p>
+            <a:pPr marL="457200" indent="-457200">
+              <a:buFont typeface="Wingdings 3" charset="2"/>
+              <a:buAutoNum type="arabicPeriod"/>
+            </a:pPr>
+            <a:r>
+              <a:rPr lang="en-IN" dirty="0" smtClean="0">
+                <a:latin typeface="Avenir LT Std 45 Book" panose="020B0502020203020204" pitchFamily="34" charset="0"/>
+              </a:rPr>
+              <a:t>Print Inverted </a:t>
+            </a:r>
+            <a:r>
+              <a:rPr lang="en-IN" dirty="0">
+                <a:latin typeface="Avenir LT Std 45 Book" panose="020B0502020203020204" pitchFamily="34" charset="0"/>
+              </a:rPr>
+              <a:t>Right Angle Triangle with * symbol ,fixed numerical and alphabet </a:t>
+            </a:r>
+            <a:r>
+              <a:rPr lang="en-IN" dirty="0" smtClean="0">
+                <a:latin typeface="Avenir LT Std 45 Book" panose="020B0502020203020204" pitchFamily="34" charset="0"/>
+              </a:rPr>
+              <a:t>in </a:t>
+            </a:r>
+            <a:r>
+              <a:rPr lang="en-IN" dirty="0">
+                <a:latin typeface="Avenir LT Std 45 Book" panose="020B0502020203020204" pitchFamily="34" charset="0"/>
+              </a:rPr>
+              <a:t>every row</a:t>
+            </a:r>
+            <a:r>
+              <a:rPr lang="en-IN" dirty="0" smtClean="0">
+                <a:latin typeface="Avenir LT Std 45 Book" panose="020B0502020203020204" pitchFamily="34" charset="0"/>
+              </a:rPr>
+              <a:t>.</a:t>
+            </a:r>
+          </a:p>
+          <a:p>
+            <a:pPr marL="457200" indent="-457200">
+              <a:buFont typeface="Wingdings 3" charset="2"/>
+              <a:buAutoNum type="arabicPeriod"/>
+            </a:pPr>
+            <a:r>
+              <a:rPr lang="en-IN" dirty="0">
+                <a:latin typeface="Avenir LT Std 45 Book" panose="020B0502020203020204" pitchFamily="34" charset="0"/>
+              </a:rPr>
+              <a:t>Print Inverted </a:t>
+            </a:r>
+            <a:r>
+              <a:rPr lang="en-IN" dirty="0" smtClean="0">
+                <a:latin typeface="Avenir LT Std 45 Book" panose="020B0502020203020204" pitchFamily="34" charset="0"/>
+              </a:rPr>
+              <a:t>Right </a:t>
+            </a:r>
+            <a:r>
+              <a:rPr lang="en-IN" dirty="0">
+                <a:latin typeface="Avenir LT Std 45 Book" panose="020B0502020203020204" pitchFamily="34" charset="0"/>
+              </a:rPr>
+              <a:t>Angle Triangle with numbers and alphabet </a:t>
+            </a:r>
+            <a:r>
+              <a:rPr lang="en-IN" dirty="0" smtClean="0">
+                <a:latin typeface="Avenir LT Std 45 Book" panose="020B0502020203020204" pitchFamily="34" charset="0"/>
+              </a:rPr>
+              <a:t>in </a:t>
+            </a:r>
+            <a:r>
+              <a:rPr lang="en-IN" dirty="0">
+                <a:latin typeface="Avenir LT Std 45 Book" panose="020B0502020203020204" pitchFamily="34" charset="0"/>
+              </a:rPr>
+              <a:t>ascending </a:t>
+            </a:r>
+            <a:r>
+              <a:rPr lang="en-IN" dirty="0" smtClean="0">
+                <a:latin typeface="Avenir LT Std 45 Book" panose="020B0502020203020204" pitchFamily="34" charset="0"/>
+              </a:rPr>
+              <a:t> and descending order</a:t>
+            </a:r>
+            <a:r>
+              <a:rPr lang="en-IN" dirty="0">
+                <a:latin typeface="Avenir LT Std 45 Book" panose="020B0502020203020204" pitchFamily="34" charset="0"/>
+              </a:rPr>
+              <a:t>.</a:t>
+            </a:r>
+          </a:p>
+          <a:p>
+            <a:pPr marL="457200" indent="-457200">
+              <a:buFont typeface="Wingdings 3" charset="2"/>
+              <a:buAutoNum type="arabicPeriod"/>
+            </a:pPr>
+            <a:endParaRPr lang="en-IN" dirty="0">
+              <a:latin typeface="Avenir LT Std 45 Book" panose="020B0502020203020204" pitchFamily="34" charset="0"/>
+            </a:endParaRPr>
+          </a:p>
+          <a:p>
+            <a:pPr marL="457200" indent="-457200">
+              <a:buAutoNum type="arabicPeriod"/>
+            </a:pPr>
+            <a:endParaRPr lang="en-IN" dirty="0" smtClean="0">
+              <a:latin typeface="Avenir LT Std 45 Book" panose="020B0502020203020204" pitchFamily="34" charset="0"/>
+            </a:endParaRPr>
+          </a:p>
+          <a:p>
+            <a:pPr marL="457200" indent="-457200">
+              <a:buAutoNum type="arabicPeriod"/>
+            </a:pPr>
+            <a:endParaRPr lang="en-IN" dirty="0" smtClean="0">
+              <a:latin typeface="Avenir LT Std 45 Book" panose="020B0502020203020204" pitchFamily="34" charset="0"/>
+            </a:endParaRPr>
+          </a:p>
+          <a:p>
+            <a:pPr marL="457200" indent="-457200">
+              <a:buFont typeface="Wingdings 3" charset="2"/>
+              <a:buAutoNum type="arabicPeriod"/>
+            </a:pPr>
+            <a:endParaRPr lang="en-IN" dirty="0">
+              <a:latin typeface="Avenir LT Std 45 Book" panose="020B0502020203020204" pitchFamily="34" charset="0"/>
+            </a:endParaRPr>
+          </a:p>
+          <a:p>
+            <a:pPr marL="457200" indent="-457200">
+              <a:buAutoNum type="arabicPeriod"/>
+            </a:pPr>
+            <a:endParaRPr lang="en-IN" dirty="0" smtClean="0">
+              <a:latin typeface="Avenir LT Std 45 Book" panose="020B0502020203020204" pitchFamily="34" charset="0"/>
+            </a:endParaRPr>
+          </a:p>
+          <a:p>
+            <a:pPr marL="457200" indent="-457200">
+              <a:buAutoNum type="arabicPeriod"/>
+            </a:pPr>
+            <a:endParaRPr lang="en-IN" dirty="0">
+              <a:latin typeface="Avenir LT Std 45 Book" panose="020B0502020203020204" pitchFamily="34" charset="0"/>
+            </a:endParaRPr>
+          </a:p>
+          <a:p>
+            <a:pPr marL="457200" indent="-457200">
+              <a:buAutoNum type="arabicPeriod"/>
+            </a:pPr>
+            <a:endParaRPr lang="en-IN" dirty="0" smtClean="0">
+              <a:latin typeface="Avenir LT Std 45 Book" panose="020B0502020203020204" pitchFamily="34" charset="0"/>
+            </a:endParaRPr>
+          </a:p>
+          <a:p>
+            <a:pPr marL="457200" indent="-457200">
+              <a:buAutoNum type="arabicPeriod"/>
+            </a:pPr>
+            <a:endParaRPr lang="en-IN" dirty="0" smtClean="0">
+              <a:latin typeface="Avenir LT Std 45 Book" panose="020B0502020203020204" pitchFamily="34" charset="0"/>
+            </a:endParaRPr>
+          </a:p>
+          <a:p>
+            <a:pPr marL="457200" indent="-457200">
+              <a:buFont typeface="Wingdings 3" charset="2"/>
+              <a:buAutoNum type="arabicPeriod"/>
+            </a:pPr>
+            <a:endParaRPr lang="en-IN" dirty="0" smtClean="0">
+              <a:latin typeface="Avenir LT Std 45 Book" panose="020B0502020203020204" pitchFamily="34" charset="0"/>
+            </a:endParaRPr>
+          </a:p>
+          <a:p>
+            <a:pPr marL="457200" indent="-457200">
+              <a:buFont typeface="Wingdings 3" charset="2"/>
+              <a:buAutoNum type="arabicPeriod"/>
+            </a:pPr>
+            <a:endParaRPr lang="en-IN" dirty="0">
+              <a:latin typeface="Avenir LT Std 45 Book" panose="020B0502020203020204" pitchFamily="34" charset="0"/>
+            </a:endParaRPr>
+          </a:p>
+          <a:p>
+            <a:pPr marL="457200" indent="-457200">
+              <a:buFont typeface="Wingdings 3" charset="2"/>
+              <a:buAutoNum type="arabicPeriod"/>
+            </a:pPr>
+            <a:endParaRPr lang="en-IN" dirty="0" smtClean="0">
+              <a:latin typeface="Avenir LT Std 45 Book" panose="020B0502020203020204" pitchFamily="34" charset="0"/>
+            </a:endParaRPr>
+          </a:p>
+          <a:p>
+            <a:pPr marL="457200" indent="-457200">
+              <a:buFont typeface="Wingdings 3" charset="2"/>
+              <a:buAutoNum type="arabicPeriod"/>
+            </a:pPr>
+            <a:endParaRPr lang="en-IN" dirty="0">
+              <a:latin typeface="Avenir LT Std 45 Book" panose="020B0502020203020204" pitchFamily="34" charset="0"/>
+            </a:endParaRPr>
+          </a:p>
+          <a:p>
+            <a:pPr marL="457200" indent="-457200">
+              <a:buAutoNum type="arabicPeriod"/>
+            </a:pPr>
+            <a:endParaRPr lang="en-IN" sz="1800" dirty="0">
+              <a:latin typeface="+mj-lt"/>
+            </a:endParaRPr>
+          </a:p>
+        </p:txBody>
+      </p:sp>
+    </p:spTree>
+    <p:extLst>
+      <p:ext uri="{BB962C8B-B14F-4D97-AF65-F5344CB8AC3E}">
+        <p14:creationId xmlns:p14="http://schemas.microsoft.com/office/powerpoint/2010/main" val="3757360469"/>
+      </p:ext>
+    </p:extLst>
+  </p:cSld>
+  <p:clrMapOvr>
+    <a:masterClrMapping/>
+  </p:clrMapOvr>
+</p:sld>
+</file>
+
+<file path=ppt/slides/slide6.xml><?xml version="1.0" encoding="utf-8"?>
+<p:sld xmlns:a="http://schemas.openxmlformats.org/drawingml/2006/main" xmlns:r="http://schemas.openxmlformats.org/officeDocument/2006/relationships" xmlns:p="http://schemas.openxmlformats.org/presentationml/2006/main">
+  <p:cSld>
+    <p:spTree>
+      <p:nvGrpSpPr>
+        <p:cNvPr id="1" name=""/>
+        <p:cNvGrpSpPr/>
+        <p:nvPr/>
+      </p:nvGrpSpPr>
+      <p:grpSpPr>
+        <a:xfrm>
+          <a:off x="0" y="0"/>
+          <a:ext cx="0" cy="0"/>
+          <a:chOff x="0" y="0"/>
+          <a:chExt cx="0" cy="0"/>
+        </a:xfrm>
+      </p:grpSpPr>
+      <p:sp>
+        <p:nvSpPr>
+          <p:cNvPr id="2" name="Title 1"/>
+          <p:cNvSpPr>
+            <a:spLocks noGrp="1"/>
+          </p:cNvSpPr>
+          <p:nvPr>
+            <p:ph type="title"/>
+          </p:nvPr>
+        </p:nvSpPr>
+        <p:spPr>
+          <a:xfrm>
+            <a:off x="710515" y="331573"/>
+            <a:ext cx="10489080" cy="669324"/>
+          </a:xfrm>
+        </p:spPr>
+        <p:txBody>
+          <a:bodyPr>
+            <a:normAutofit fontScale="90000"/>
+          </a:bodyPr>
+          <a:lstStyle/>
+          <a:p>
+            <a:pPr algn="l"/>
+            <a:r>
+              <a:rPr lang="en-IN" b="0" dirty="0" smtClean="0">
+                <a:latin typeface="Avenir LT Std 65 Medium" panose="020B0803020203020204" pitchFamily="34" charset="0"/>
+              </a:rPr>
+              <a:t>Diamond Patterns</a:t>
+            </a:r>
+            <a:endParaRPr lang="en-IN" b="0" dirty="0">
+              <a:latin typeface="Avenir LT Std 65 Medium" panose="020B0803020203020204" pitchFamily="34" charset="0"/>
+            </a:endParaRPr>
+          </a:p>
+        </p:txBody>
+      </p:sp>
+      <p:sp>
+        <p:nvSpPr>
+          <p:cNvPr id="3" name="Content Placeholder 2"/>
+          <p:cNvSpPr>
+            <a:spLocks noGrp="1"/>
+          </p:cNvSpPr>
+          <p:nvPr>
+            <p:ph idx="1"/>
+          </p:nvPr>
+        </p:nvSpPr>
+        <p:spPr>
+          <a:xfrm>
+            <a:off x="864973" y="1136822"/>
+            <a:ext cx="10972800" cy="5362832"/>
+          </a:xfrm>
+        </p:spPr>
+        <p:txBody>
+          <a:bodyPr>
+            <a:normAutofit/>
+          </a:bodyPr>
+          <a:lstStyle/>
+          <a:p>
+            <a:pPr marL="457200" indent="-457200">
+              <a:buAutoNum type="arabicPeriod"/>
+            </a:pPr>
+            <a:r>
+              <a:rPr lang="en-IN" dirty="0" smtClean="0">
+                <a:latin typeface="Avenir LT Std 45 Book" panose="020B0502020203020204" pitchFamily="34" charset="0"/>
+              </a:rPr>
+              <a:t>Print diamond pattern with * symbol ,fixed numerical and alphabet symbol in every row.</a:t>
+            </a:r>
+          </a:p>
+          <a:p>
+            <a:pPr marL="457200" indent="-457200">
+              <a:buFont typeface="Wingdings 3" charset="2"/>
+              <a:buAutoNum type="arabicPeriod"/>
+            </a:pPr>
+            <a:r>
+              <a:rPr lang="en-IN" dirty="0" smtClean="0">
+                <a:latin typeface="Avenir LT Std 45 Book" panose="020B0502020203020204" pitchFamily="34" charset="0"/>
+              </a:rPr>
+              <a:t>Print </a:t>
+            </a:r>
+            <a:r>
+              <a:rPr lang="en-IN" dirty="0">
+                <a:latin typeface="Avenir LT Std 45 Book" panose="020B0502020203020204" pitchFamily="34" charset="0"/>
+              </a:rPr>
+              <a:t>diamond pattern with </a:t>
+            </a:r>
+            <a:r>
+              <a:rPr lang="en-IN" dirty="0" smtClean="0">
+                <a:latin typeface="Avenir LT Std 45 Book" panose="020B0502020203020204" pitchFamily="34" charset="0"/>
+              </a:rPr>
+              <a:t>digits and alphabets in ascending order.</a:t>
+            </a:r>
+            <a:endParaRPr lang="en-IN" dirty="0">
+              <a:latin typeface="Avenir LT Std 45 Book" panose="020B0502020203020204" pitchFamily="34" charset="0"/>
+            </a:endParaRPr>
+          </a:p>
+          <a:p>
+            <a:pPr marL="457200" indent="-457200">
+              <a:buFont typeface="Wingdings 3" charset="2"/>
+              <a:buAutoNum type="arabicPeriod"/>
+            </a:pPr>
+            <a:r>
+              <a:rPr lang="en-IN" dirty="0">
+                <a:latin typeface="Avenir LT Std 45 Book" panose="020B0502020203020204" pitchFamily="34" charset="0"/>
+              </a:rPr>
+              <a:t>Print diamond pattern with digits and alphabets in </a:t>
+            </a:r>
+            <a:r>
+              <a:rPr lang="en-IN" dirty="0" smtClean="0">
+                <a:latin typeface="Avenir LT Std 45 Book" panose="020B0502020203020204" pitchFamily="34" charset="0"/>
+              </a:rPr>
+              <a:t>descending </a:t>
+            </a:r>
+            <a:r>
+              <a:rPr lang="en-IN" dirty="0">
+                <a:latin typeface="Avenir LT Std 45 Book" panose="020B0502020203020204" pitchFamily="34" charset="0"/>
+              </a:rPr>
+              <a:t>order.</a:t>
+            </a:r>
+          </a:p>
+          <a:p>
+            <a:pPr marL="457200" indent="-457200">
+              <a:buAutoNum type="arabicPeriod"/>
+            </a:pPr>
+            <a:endParaRPr lang="en-IN" dirty="0" smtClean="0">
+              <a:latin typeface="Avenir LT Std 45 Book" panose="020B0502020203020204" pitchFamily="34" charset="0"/>
+            </a:endParaRPr>
+          </a:p>
+          <a:p>
+            <a:pPr marL="0" indent="0">
+              <a:buNone/>
+            </a:pPr>
+            <a:endParaRPr lang="en-IN" dirty="0">
+              <a:latin typeface="Avenir LT Std 45 Book" panose="020B0502020203020204" pitchFamily="34" charset="0"/>
+            </a:endParaRPr>
+          </a:p>
+          <a:p>
+            <a:pPr marL="457200" indent="-457200">
+              <a:buAutoNum type="arabicPeriod"/>
+            </a:pPr>
+            <a:endParaRPr lang="en-IN" dirty="0" smtClean="0">
+              <a:latin typeface="Avenir LT Std 45 Book" panose="020B0502020203020204" pitchFamily="34" charset="0"/>
+            </a:endParaRPr>
+          </a:p>
+          <a:p>
+            <a:pPr marL="457200" indent="-457200">
+              <a:buAutoNum type="arabicPeriod"/>
+            </a:pPr>
+            <a:endParaRPr lang="en-IN" dirty="0" smtClean="0">
+              <a:latin typeface="Avenir LT Std 45 Book" panose="020B0502020203020204" pitchFamily="34" charset="0"/>
+            </a:endParaRPr>
+          </a:p>
+          <a:p>
+            <a:pPr marL="457200" indent="-457200">
+              <a:buFont typeface="Wingdings 3" charset="2"/>
+              <a:buAutoNum type="arabicPeriod"/>
+            </a:pPr>
+            <a:endParaRPr lang="en-IN" dirty="0">
+              <a:latin typeface="Avenir LT Std 45 Book" panose="020B0502020203020204" pitchFamily="34" charset="0"/>
+            </a:endParaRPr>
+          </a:p>
+          <a:p>
+            <a:pPr marL="457200" indent="-457200">
+              <a:buAutoNum type="arabicPeriod"/>
+            </a:pPr>
+            <a:endParaRPr lang="en-IN" dirty="0" smtClean="0">
+              <a:latin typeface="Avenir LT Std 45 Book" panose="020B0502020203020204" pitchFamily="34" charset="0"/>
+            </a:endParaRPr>
+          </a:p>
+          <a:p>
+            <a:pPr marL="457200" indent="-457200">
+              <a:buAutoNum type="arabicPeriod"/>
+            </a:pPr>
+            <a:endParaRPr lang="en-IN" dirty="0">
+              <a:latin typeface="Avenir LT Std 45 Book" panose="020B0502020203020204" pitchFamily="34" charset="0"/>
+            </a:endParaRPr>
+          </a:p>
+          <a:p>
+            <a:pPr marL="457200" indent="-457200">
+              <a:buAutoNum type="arabicPeriod"/>
+            </a:pPr>
+            <a:endParaRPr lang="en-IN" dirty="0" smtClean="0">
+              <a:latin typeface="Avenir LT Std 45 Book" panose="020B0502020203020204" pitchFamily="34" charset="0"/>
+            </a:endParaRPr>
+          </a:p>
+          <a:p>
+            <a:pPr marL="457200" indent="-457200">
+              <a:buAutoNum type="arabicPeriod"/>
+            </a:pPr>
+            <a:endParaRPr lang="en-IN" dirty="0">
+              <a:latin typeface="Avenir LT Std 45 Book" panose="020B0502020203020204" pitchFamily="34" charset="0"/>
+            </a:endParaRPr>
+          </a:p>
+          <a:p>
+            <a:pPr marL="457200" indent="-457200">
+              <a:buAutoNum type="arabicPeriod"/>
+            </a:pPr>
+            <a:endParaRPr lang="en-IN" dirty="0" smtClean="0">
+              <a:latin typeface="Avenir LT Std 45 Book" panose="020B0502020203020204" pitchFamily="34" charset="0"/>
+            </a:endParaRPr>
+          </a:p>
+          <a:p>
+            <a:pPr marL="457200" indent="-457200">
+              <a:buAutoNum type="arabicPeriod"/>
+            </a:pPr>
+            <a:endParaRPr lang="en-IN" dirty="0" smtClean="0">
+              <a:latin typeface="Avenir LT Std 45 Book" panose="020B0502020203020204" pitchFamily="34" charset="0"/>
+            </a:endParaRPr>
+          </a:p>
+          <a:p>
+            <a:pPr marL="457200" indent="-457200">
+              <a:buFont typeface="Wingdings 3" charset="2"/>
+              <a:buAutoNum type="arabicPeriod"/>
+            </a:pPr>
+            <a:endParaRPr lang="en-IN" dirty="0" smtClean="0">
+              <a:latin typeface="Avenir LT Std 45 Book" panose="020B0502020203020204" pitchFamily="34" charset="0"/>
+            </a:endParaRPr>
+          </a:p>
+          <a:p>
+            <a:pPr marL="457200" indent="-457200">
+              <a:buFont typeface="Wingdings 3" charset="2"/>
+              <a:buAutoNum type="arabicPeriod"/>
+            </a:pPr>
+            <a:endParaRPr lang="en-IN" dirty="0">
+              <a:latin typeface="Avenir LT Std 45 Book" panose="020B0502020203020204" pitchFamily="34" charset="0"/>
+            </a:endParaRPr>
+          </a:p>
+          <a:p>
+            <a:pPr marL="457200" indent="-457200">
+              <a:buFont typeface="Wingdings 3" charset="2"/>
+              <a:buAutoNum type="arabicPeriod"/>
+            </a:pPr>
+            <a:endParaRPr lang="en-IN" dirty="0" smtClean="0">
+              <a:latin typeface="Avenir LT Std 45 Book" panose="020B0502020203020204" pitchFamily="34" charset="0"/>
+            </a:endParaRPr>
+          </a:p>
+          <a:p>
+            <a:pPr marL="457200" indent="-457200">
+              <a:buFont typeface="Wingdings 3" charset="2"/>
+              <a:buAutoNum type="arabicPeriod"/>
+            </a:pPr>
+            <a:endParaRPr lang="en-IN" dirty="0">
+              <a:latin typeface="Avenir LT Std 45 Book" panose="020B0502020203020204" pitchFamily="34" charset="0"/>
+            </a:endParaRPr>
+          </a:p>
+          <a:p>
+            <a:pPr marL="457200" indent="-457200">
+              <a:buAutoNum type="arabicPeriod"/>
+            </a:pPr>
+            <a:endParaRPr lang="en-IN" sz="1800" dirty="0">
+              <a:latin typeface="+mj-lt"/>
+            </a:endParaRPr>
+          </a:p>
+        </p:txBody>
+      </p:sp>
+    </p:spTree>
+    <p:extLst>
+      <p:ext uri="{BB962C8B-B14F-4D97-AF65-F5344CB8AC3E}">
+        <p14:creationId xmlns:p14="http://schemas.microsoft.com/office/powerpoint/2010/main" val="1605538662"/>
+      </p:ext>
+    </p:extLst>
+  </p:cSld>
+  <p:clrMapOvr>
+    <a:masterClrMapping/>
+  </p:clrMapOvr>
+</p:sld>
+</file>
+
+<file path=ppt/slides/slide7.xml><?xml version="1.0" encoding="utf-8"?>
+<p:sld xmlns:a="http://schemas.openxmlformats.org/drawingml/2006/main" xmlns:r="http://schemas.openxmlformats.org/officeDocument/2006/relationships" xmlns:p="http://schemas.openxmlformats.org/presentationml/2006/main">
+  <p:cSld>
+    <p:spTree>
+      <p:nvGrpSpPr>
+        <p:cNvPr id="1" name=""/>
+        <p:cNvGrpSpPr/>
+        <p:nvPr/>
+      </p:nvGrpSpPr>
+      <p:grpSpPr>
+        <a:xfrm>
+          <a:off x="0" y="0"/>
+          <a:ext cx="0" cy="0"/>
+          <a:chOff x="0" y="0"/>
+          <a:chExt cx="0" cy="0"/>
+        </a:xfrm>
+      </p:grpSpPr>
+      <p:sp>
+        <p:nvSpPr>
+          <p:cNvPr id="2" name="Title 1"/>
+          <p:cNvSpPr>
+            <a:spLocks noGrp="1"/>
+          </p:cNvSpPr>
+          <p:nvPr>
+            <p:ph type="title"/>
+          </p:nvPr>
+        </p:nvSpPr>
+        <p:spPr>
+          <a:xfrm>
+            <a:off x="710515" y="331573"/>
+            <a:ext cx="10489080" cy="669324"/>
+          </a:xfrm>
+        </p:spPr>
+        <p:txBody>
+          <a:bodyPr>
+            <a:normAutofit fontScale="90000"/>
+          </a:bodyPr>
+          <a:lstStyle/>
+          <a:p>
+            <a:pPr algn="l"/>
+            <a:r>
+              <a:rPr lang="en-IN" b="0" dirty="0" smtClean="0">
+                <a:latin typeface="Avenir LT Std 65 Medium" panose="020B0803020203020204" pitchFamily="34" charset="0"/>
+              </a:rPr>
+              <a:t>Hollow Diamond </a:t>
+            </a:r>
+            <a:r>
+              <a:rPr lang="en-IN" b="0" dirty="0" smtClean="0">
+                <a:latin typeface="Avenir LT Std 65 Medium" panose="020B0803020203020204" pitchFamily="34" charset="0"/>
+              </a:rPr>
+              <a:t>Patterns</a:t>
+            </a:r>
+            <a:endParaRPr lang="en-IN" b="0" dirty="0">
+              <a:latin typeface="Avenir LT Std 65 Medium" panose="020B0803020203020204" pitchFamily="34" charset="0"/>
+            </a:endParaRPr>
+          </a:p>
+        </p:txBody>
+      </p:sp>
+      <p:sp>
+        <p:nvSpPr>
+          <p:cNvPr id="3" name="Content Placeholder 2"/>
+          <p:cNvSpPr>
+            <a:spLocks noGrp="1"/>
+          </p:cNvSpPr>
+          <p:nvPr>
+            <p:ph idx="1"/>
+          </p:nvPr>
+        </p:nvSpPr>
+        <p:spPr>
+          <a:xfrm>
+            <a:off x="864973" y="1136822"/>
+            <a:ext cx="10972800" cy="5362832"/>
+          </a:xfrm>
+        </p:spPr>
+        <p:txBody>
+          <a:bodyPr>
+            <a:normAutofit/>
+          </a:bodyPr>
+          <a:lstStyle/>
+          <a:p>
+            <a:pPr marL="457200" indent="-457200">
+              <a:buAutoNum type="arabicPeriod"/>
+            </a:pPr>
+            <a:r>
+              <a:rPr lang="en-IN" dirty="0" smtClean="0">
+                <a:latin typeface="Avenir LT Std 45 Book" panose="020B0502020203020204" pitchFamily="34" charset="0"/>
+              </a:rPr>
+              <a:t>Print </a:t>
+            </a:r>
+            <a:r>
+              <a:rPr lang="en-IN" dirty="0" smtClean="0">
+                <a:latin typeface="Avenir LT Std 45 Book" panose="020B0502020203020204" pitchFamily="34" charset="0"/>
+              </a:rPr>
+              <a:t>hollow diamond </a:t>
+            </a:r>
+            <a:r>
+              <a:rPr lang="en-IN" dirty="0" smtClean="0">
+                <a:latin typeface="Avenir LT Std 45 Book" panose="020B0502020203020204" pitchFamily="34" charset="0"/>
+              </a:rPr>
+              <a:t>pattern with * </a:t>
+            </a:r>
+            <a:r>
+              <a:rPr lang="en-IN" dirty="0" smtClean="0">
+                <a:latin typeface="Avenir LT Std 45 Book" panose="020B0502020203020204" pitchFamily="34" charset="0"/>
+              </a:rPr>
+              <a:t>symbol</a:t>
+            </a:r>
+            <a:endParaRPr lang="en-IN" dirty="0" smtClean="0">
+              <a:latin typeface="Avenir LT Std 45 Book" panose="020B0502020203020204" pitchFamily="34" charset="0"/>
+            </a:endParaRPr>
+          </a:p>
+          <a:p>
+            <a:pPr marL="457200" indent="-457200">
+              <a:buFont typeface="Wingdings 3" charset="2"/>
+              <a:buAutoNum type="arabicPeriod"/>
+            </a:pPr>
+            <a:r>
+              <a:rPr lang="en-IN" dirty="0" smtClean="0">
+                <a:latin typeface="Avenir LT Std 45 Book" panose="020B0502020203020204" pitchFamily="34" charset="0"/>
+              </a:rPr>
+              <a:t>Print </a:t>
+            </a:r>
+            <a:r>
+              <a:rPr lang="en-IN" dirty="0" smtClean="0">
+                <a:latin typeface="Avenir LT Std 45 Book" panose="020B0502020203020204" pitchFamily="34" charset="0"/>
+              </a:rPr>
+              <a:t>hollow diamond </a:t>
+            </a:r>
+            <a:r>
+              <a:rPr lang="en-IN" dirty="0">
+                <a:latin typeface="Avenir LT Std 45 Book" panose="020B0502020203020204" pitchFamily="34" charset="0"/>
+              </a:rPr>
+              <a:t>pattern with </a:t>
+            </a:r>
+            <a:r>
+              <a:rPr lang="en-IN" dirty="0" smtClean="0">
+                <a:latin typeface="Avenir LT Std 45 Book" panose="020B0502020203020204" pitchFamily="34" charset="0"/>
+              </a:rPr>
+              <a:t>numbers.</a:t>
+            </a:r>
+            <a:endParaRPr lang="en-IN" dirty="0">
+              <a:latin typeface="Avenir LT Std 45 Book" panose="020B0502020203020204" pitchFamily="34" charset="0"/>
+            </a:endParaRPr>
+          </a:p>
+          <a:p>
+            <a:pPr marL="457200" indent="-457200">
+              <a:buFont typeface="Wingdings 3" charset="2"/>
+              <a:buAutoNum type="arabicPeriod"/>
+            </a:pPr>
+            <a:r>
+              <a:rPr lang="en-IN" dirty="0">
+                <a:latin typeface="Avenir LT Std 45 Book" panose="020B0502020203020204" pitchFamily="34" charset="0"/>
+              </a:rPr>
+              <a:t>Print </a:t>
+            </a:r>
+            <a:r>
+              <a:rPr lang="en-IN" dirty="0" smtClean="0">
+                <a:latin typeface="Avenir LT Std 45 Book" panose="020B0502020203020204" pitchFamily="34" charset="0"/>
+              </a:rPr>
+              <a:t>hollow diamond </a:t>
+            </a:r>
+            <a:r>
+              <a:rPr lang="en-IN" dirty="0">
+                <a:latin typeface="Avenir LT Std 45 Book" panose="020B0502020203020204" pitchFamily="34" charset="0"/>
+              </a:rPr>
+              <a:t>pattern with </a:t>
+            </a:r>
+            <a:r>
+              <a:rPr lang="en-IN" dirty="0" smtClean="0">
+                <a:latin typeface="Avenir LT Std 45 Book" panose="020B0502020203020204" pitchFamily="34" charset="0"/>
+              </a:rPr>
+              <a:t>alphabets.</a:t>
+            </a:r>
+            <a:endParaRPr lang="en-IN" dirty="0">
+              <a:latin typeface="Avenir LT Std 45 Book" panose="020B0502020203020204" pitchFamily="34" charset="0"/>
+            </a:endParaRPr>
+          </a:p>
+          <a:p>
+            <a:pPr marL="457200" indent="-457200">
+              <a:buAutoNum type="arabicPeriod"/>
+            </a:pPr>
+            <a:endParaRPr lang="en-IN" dirty="0" smtClean="0">
+              <a:latin typeface="Avenir LT Std 45 Book" panose="020B0502020203020204" pitchFamily="34" charset="0"/>
+            </a:endParaRPr>
+          </a:p>
+          <a:p>
+            <a:pPr marL="0" indent="0">
+              <a:buNone/>
+            </a:pPr>
+            <a:endParaRPr lang="en-IN" dirty="0">
+              <a:latin typeface="Avenir LT Std 45 Book" panose="020B0502020203020204" pitchFamily="34" charset="0"/>
+            </a:endParaRPr>
+          </a:p>
+          <a:p>
+            <a:pPr marL="457200" indent="-457200">
+              <a:buAutoNum type="arabicPeriod"/>
+            </a:pPr>
+            <a:endParaRPr lang="en-IN" dirty="0" smtClean="0">
+              <a:latin typeface="Avenir LT Std 45 Book" panose="020B0502020203020204" pitchFamily="34" charset="0"/>
+            </a:endParaRPr>
+          </a:p>
+          <a:p>
+            <a:pPr marL="457200" indent="-457200">
+              <a:buAutoNum type="arabicPeriod"/>
+            </a:pPr>
+            <a:endParaRPr lang="en-IN" dirty="0" smtClean="0">
+              <a:latin typeface="Avenir LT Std 45 Book" panose="020B0502020203020204" pitchFamily="34" charset="0"/>
+            </a:endParaRPr>
+          </a:p>
+          <a:p>
+            <a:pPr marL="457200" indent="-457200">
+              <a:buFont typeface="Wingdings 3" charset="2"/>
+              <a:buAutoNum type="arabicPeriod"/>
+            </a:pPr>
+            <a:endParaRPr lang="en-IN" dirty="0">
+              <a:latin typeface="Avenir LT Std 45 Book" panose="020B0502020203020204" pitchFamily="34" charset="0"/>
+            </a:endParaRPr>
+          </a:p>
+          <a:p>
+            <a:pPr marL="457200" indent="-457200">
+              <a:buAutoNum type="arabicPeriod"/>
+            </a:pPr>
+            <a:endParaRPr lang="en-IN" dirty="0" smtClean="0">
+              <a:latin typeface="Avenir LT Std 45 Book" panose="020B0502020203020204" pitchFamily="34" charset="0"/>
+            </a:endParaRPr>
+          </a:p>
+          <a:p>
+            <a:pPr marL="457200" indent="-457200">
+              <a:buAutoNum type="arabicPeriod"/>
+            </a:pPr>
+            <a:endParaRPr lang="en-IN" dirty="0">
+              <a:latin typeface="Avenir LT Std 45 Book" panose="020B0502020203020204" pitchFamily="34" charset="0"/>
+            </a:endParaRPr>
+          </a:p>
+          <a:p>
+            <a:pPr marL="457200" indent="-457200">
+              <a:buAutoNum type="arabicPeriod"/>
+            </a:pPr>
+            <a:endParaRPr lang="en-IN" dirty="0" smtClean="0">
+              <a:latin typeface="Avenir LT Std 45 Book" panose="020B0502020203020204" pitchFamily="34" charset="0"/>
+            </a:endParaRPr>
+          </a:p>
+          <a:p>
+            <a:pPr marL="457200" indent="-457200">
+              <a:buAutoNum type="arabicPeriod"/>
+            </a:pPr>
+            <a:endParaRPr lang="en-IN" dirty="0">
+              <a:latin typeface="Avenir LT Std 45 Book" panose="020B0502020203020204" pitchFamily="34" charset="0"/>
+            </a:endParaRPr>
+          </a:p>
+          <a:p>
+            <a:pPr marL="457200" indent="-457200">
+              <a:buAutoNum type="arabicPeriod"/>
+            </a:pPr>
+            <a:endParaRPr lang="en-IN" dirty="0" smtClean="0">
+              <a:latin typeface="Avenir LT Std 45 Book" panose="020B0502020203020204" pitchFamily="34" charset="0"/>
+            </a:endParaRPr>
+          </a:p>
+          <a:p>
+            <a:pPr marL="457200" indent="-457200">
+              <a:buAutoNum type="arabicPeriod"/>
+            </a:pPr>
+            <a:endParaRPr lang="en-IN" dirty="0" smtClean="0">
+              <a:latin typeface="Avenir LT Std 45 Book" panose="020B0502020203020204" pitchFamily="34" charset="0"/>
+            </a:endParaRPr>
+          </a:p>
+          <a:p>
+            <a:pPr marL="457200" indent="-457200">
+              <a:buFont typeface="Wingdings 3" charset="2"/>
+              <a:buAutoNum type="arabicPeriod"/>
+            </a:pPr>
+            <a:endParaRPr lang="en-IN" dirty="0" smtClean="0">
+              <a:latin typeface="Avenir LT Std 45 Book" panose="020B0502020203020204" pitchFamily="34" charset="0"/>
+            </a:endParaRPr>
+          </a:p>
+          <a:p>
+            <a:pPr marL="457200" indent="-457200">
+              <a:buFont typeface="Wingdings 3" charset="2"/>
+              <a:buAutoNum type="arabicPeriod"/>
+            </a:pPr>
+            <a:endParaRPr lang="en-IN" dirty="0">
+              <a:latin typeface="Avenir LT Std 45 Book" panose="020B0502020203020204" pitchFamily="34" charset="0"/>
+            </a:endParaRPr>
+          </a:p>
+          <a:p>
+            <a:pPr marL="457200" indent="-457200">
+              <a:buFont typeface="Wingdings 3" charset="2"/>
+              <a:buAutoNum type="arabicPeriod"/>
+            </a:pPr>
+            <a:endParaRPr lang="en-IN" dirty="0" smtClean="0">
+              <a:latin typeface="Avenir LT Std 45 Book" panose="020B0502020203020204" pitchFamily="34" charset="0"/>
+            </a:endParaRPr>
+          </a:p>
+          <a:p>
+            <a:pPr marL="457200" indent="-457200">
+              <a:buFont typeface="Wingdings 3" charset="2"/>
+              <a:buAutoNum type="arabicPeriod"/>
+            </a:pPr>
+            <a:endParaRPr lang="en-IN" dirty="0">
+              <a:latin typeface="Avenir LT Std 45 Book" panose="020B0502020203020204" pitchFamily="34" charset="0"/>
+            </a:endParaRPr>
+          </a:p>
+          <a:p>
+            <a:pPr marL="457200" indent="-457200">
+              <a:buAutoNum type="arabicPeriod"/>
+            </a:pPr>
+            <a:endParaRPr lang="en-IN" sz="1800" dirty="0">
+              <a:latin typeface="+mj-lt"/>
+            </a:endParaRPr>
+          </a:p>
+        </p:txBody>
+      </p:sp>
+    </p:spTree>
+    <p:extLst>
+      <p:ext uri="{BB962C8B-B14F-4D97-AF65-F5344CB8AC3E}">
+        <p14:creationId xmlns:p14="http://schemas.microsoft.com/office/powerpoint/2010/main" val="942933239"/>
+      </p:ext>
+    </p:extLst>
+  </p:cSld>
+  <p:clrMapOvr>
+    <a:masterClrMapping/>
+  </p:clrMapOvr>
+</p:sld>
+</file>
+
+<file path=ppt/slides/slide8.xml><?xml version="1.0" encoding="utf-8"?>
+<p:sld xmlns:a="http://schemas.openxmlformats.org/drawingml/2006/main" xmlns:r="http://schemas.openxmlformats.org/officeDocument/2006/relationships" xmlns:p="http://schemas.openxmlformats.org/presentationml/2006/main">
+  <p:cSld>
+    <p:spTree>
+      <p:nvGrpSpPr>
+        <p:cNvPr id="1" name=""/>
+        <p:cNvGrpSpPr/>
+        <p:nvPr/>
+      </p:nvGrpSpPr>
+      <p:grpSpPr>
+        <a:xfrm>
+          <a:off x="0" y="0"/>
+          <a:ext cx="0" cy="0"/>
+          <a:chOff x="0" y="0"/>
+          <a:chExt cx="0" cy="0"/>
+        </a:xfrm>
+      </p:grpSpPr>
+      <p:sp>
+        <p:nvSpPr>
+          <p:cNvPr id="2" name="Title 1"/>
+          <p:cNvSpPr>
+            <a:spLocks noGrp="1"/>
+          </p:cNvSpPr>
+          <p:nvPr>
+            <p:ph type="title"/>
+          </p:nvPr>
+        </p:nvSpPr>
+        <p:spPr>
+          <a:xfrm>
+            <a:off x="710515" y="331573"/>
+            <a:ext cx="10489080" cy="669324"/>
+          </a:xfrm>
+        </p:spPr>
+        <p:txBody>
+          <a:bodyPr>
+            <a:normAutofit fontScale="90000"/>
+          </a:bodyPr>
+          <a:lstStyle/>
+          <a:p>
+            <a:pPr algn="l"/>
+            <a:r>
+              <a:rPr lang="en-IN" b="0" dirty="0" smtClean="0">
+                <a:latin typeface="Avenir LT Std 65 Medium" panose="020B0803020203020204" pitchFamily="34" charset="0"/>
+              </a:rPr>
+              <a:t>Half - Diamond Patterns</a:t>
+            </a:r>
+            <a:endParaRPr lang="en-IN" b="0" dirty="0">
+              <a:latin typeface="Avenir LT Std 65 Medium" panose="020B0803020203020204" pitchFamily="34" charset="0"/>
+            </a:endParaRPr>
+          </a:p>
+        </p:txBody>
+      </p:sp>
+      <p:sp>
+        <p:nvSpPr>
+          <p:cNvPr id="3" name="Content Placeholder 2"/>
+          <p:cNvSpPr>
+            <a:spLocks noGrp="1"/>
+          </p:cNvSpPr>
+          <p:nvPr>
+            <p:ph idx="1"/>
+          </p:nvPr>
+        </p:nvSpPr>
+        <p:spPr>
+          <a:xfrm>
+            <a:off x="864973" y="1136822"/>
+            <a:ext cx="10972800" cy="5362832"/>
+          </a:xfrm>
+        </p:spPr>
+        <p:txBody>
+          <a:bodyPr>
+            <a:normAutofit/>
+          </a:bodyPr>
+          <a:lstStyle/>
+          <a:p>
+            <a:pPr marL="457200" indent="-457200">
+              <a:buAutoNum type="arabicPeriod"/>
+            </a:pPr>
+            <a:r>
+              <a:rPr lang="en-IN" dirty="0" smtClean="0">
+                <a:latin typeface="Avenir LT Std 45 Book" panose="020B0502020203020204" pitchFamily="34" charset="0"/>
+              </a:rPr>
+              <a:t>Print half-diamond pattern with * symbol ,fixed digits and alphabet in every row.</a:t>
+            </a:r>
+          </a:p>
+          <a:p>
+            <a:pPr marL="457200" indent="-457200">
+              <a:buAutoNum type="arabicPeriod"/>
+            </a:pPr>
+            <a:endParaRPr lang="en-IN" dirty="0" smtClean="0">
+              <a:latin typeface="Avenir LT Std 45 Book" panose="020B0502020203020204" pitchFamily="34" charset="0"/>
+            </a:endParaRPr>
+          </a:p>
+          <a:p>
+            <a:pPr marL="0" indent="0">
+              <a:buNone/>
+            </a:pPr>
+            <a:endParaRPr lang="en-IN" dirty="0">
+              <a:latin typeface="Avenir LT Std 45 Book" panose="020B0502020203020204" pitchFamily="34" charset="0"/>
+            </a:endParaRPr>
+          </a:p>
+          <a:p>
+            <a:pPr marL="457200" indent="-457200">
+              <a:buAutoNum type="arabicPeriod"/>
+            </a:pPr>
+            <a:endParaRPr lang="en-IN" dirty="0" smtClean="0">
+              <a:latin typeface="Avenir LT Std 45 Book" panose="020B0502020203020204" pitchFamily="34" charset="0"/>
+            </a:endParaRPr>
+          </a:p>
+          <a:p>
+            <a:pPr marL="457200" indent="-457200">
+              <a:buAutoNum type="arabicPeriod"/>
+            </a:pPr>
+            <a:endParaRPr lang="en-IN" dirty="0" smtClean="0">
+              <a:latin typeface="Avenir LT Std 45 Book" panose="020B0502020203020204" pitchFamily="34" charset="0"/>
+            </a:endParaRPr>
+          </a:p>
+          <a:p>
+            <a:pPr marL="457200" indent="-457200">
+              <a:buFont typeface="Wingdings 3" charset="2"/>
+              <a:buAutoNum type="arabicPeriod"/>
+            </a:pPr>
+            <a:endParaRPr lang="en-IN" dirty="0">
+              <a:latin typeface="Avenir LT Std 45 Book" panose="020B0502020203020204" pitchFamily="34" charset="0"/>
+            </a:endParaRPr>
+          </a:p>
+          <a:p>
+            <a:pPr marL="457200" indent="-457200">
+              <a:buAutoNum type="arabicPeriod"/>
+            </a:pPr>
+            <a:endParaRPr lang="en-IN" dirty="0" smtClean="0">
+              <a:latin typeface="Avenir LT Std 45 Book" panose="020B0502020203020204" pitchFamily="34" charset="0"/>
+            </a:endParaRPr>
+          </a:p>
+          <a:p>
+            <a:pPr marL="457200" indent="-457200">
+              <a:buAutoNum type="arabicPeriod"/>
+            </a:pPr>
+            <a:endParaRPr lang="en-IN" dirty="0">
+              <a:latin typeface="Avenir LT Std 45 Book" panose="020B0502020203020204" pitchFamily="34" charset="0"/>
+            </a:endParaRPr>
+          </a:p>
+          <a:p>
+            <a:pPr marL="457200" indent="-457200">
+              <a:buAutoNum type="arabicPeriod"/>
+            </a:pPr>
+            <a:endParaRPr lang="en-IN" dirty="0" smtClean="0">
+              <a:latin typeface="Avenir LT Std 45 Book" panose="020B0502020203020204" pitchFamily="34" charset="0"/>
+            </a:endParaRPr>
+          </a:p>
+          <a:p>
+            <a:pPr marL="457200" indent="-457200">
+              <a:buAutoNum type="arabicPeriod"/>
+            </a:pPr>
+            <a:endParaRPr lang="en-IN" dirty="0">
+              <a:latin typeface="Avenir LT Std 45 Book" panose="020B0502020203020204" pitchFamily="34" charset="0"/>
+            </a:endParaRPr>
+          </a:p>
+          <a:p>
+            <a:pPr marL="457200" indent="-457200">
+              <a:buAutoNum type="arabicPeriod"/>
+            </a:pPr>
+            <a:endParaRPr lang="en-IN" dirty="0" smtClean="0">
+              <a:latin typeface="Avenir LT Std 45 Book" panose="020B0502020203020204" pitchFamily="34" charset="0"/>
+            </a:endParaRPr>
+          </a:p>
+          <a:p>
+            <a:pPr marL="457200" indent="-457200">
+              <a:buAutoNum type="arabicPeriod"/>
+            </a:pPr>
+            <a:endParaRPr lang="en-IN" dirty="0" smtClean="0">
+              <a:latin typeface="Avenir LT Std 45 Book" panose="020B0502020203020204" pitchFamily="34" charset="0"/>
+            </a:endParaRPr>
+          </a:p>
+          <a:p>
+            <a:pPr marL="457200" indent="-457200">
+              <a:buFont typeface="Wingdings 3" charset="2"/>
+              <a:buAutoNum type="arabicPeriod"/>
+            </a:pPr>
+            <a:endParaRPr lang="en-IN" dirty="0" smtClean="0">
+              <a:latin typeface="Avenir LT Std 45 Book" panose="020B0502020203020204" pitchFamily="34" charset="0"/>
+            </a:endParaRPr>
+          </a:p>
+          <a:p>
+            <a:pPr marL="457200" indent="-457200">
+              <a:buFont typeface="Wingdings 3" charset="2"/>
+              <a:buAutoNum type="arabicPeriod"/>
+            </a:pPr>
+            <a:endParaRPr lang="en-IN" dirty="0">
+              <a:latin typeface="Avenir LT Std 45 Book" panose="020B0502020203020204" pitchFamily="34" charset="0"/>
+            </a:endParaRPr>
+          </a:p>
+          <a:p>
+            <a:pPr marL="457200" indent="-457200">
+              <a:buFont typeface="Wingdings 3" charset="2"/>
+              <a:buAutoNum type="arabicPeriod"/>
+            </a:pPr>
+            <a:endParaRPr lang="en-IN" dirty="0" smtClean="0">
+              <a:latin typeface="Avenir LT Std 45 Book" panose="020B0502020203020204" pitchFamily="34" charset="0"/>
+            </a:endParaRPr>
+          </a:p>
+          <a:p>
+            <a:pPr marL="457200" indent="-457200">
+              <a:buFont typeface="Wingdings 3" charset="2"/>
+              <a:buAutoNum type="arabicPeriod"/>
+            </a:pPr>
+            <a:endParaRPr lang="en-IN" dirty="0">
+              <a:latin typeface="Avenir LT Std 45 Book" panose="020B0502020203020204" pitchFamily="34" charset="0"/>
+            </a:endParaRPr>
+          </a:p>
+          <a:p>
+            <a:pPr marL="457200" indent="-457200">
+              <a:buAutoNum type="arabicPeriod"/>
+            </a:pPr>
+            <a:endParaRPr lang="en-IN" sz="1800" dirty="0">
+              <a:latin typeface="+mj-lt"/>
+            </a:endParaRPr>
+          </a:p>
+        </p:txBody>
+      </p:sp>
+    </p:spTree>
+    <p:extLst>
+      <p:ext uri="{BB962C8B-B14F-4D97-AF65-F5344CB8AC3E}">
+        <p14:creationId xmlns:p14="http://schemas.microsoft.com/office/powerpoint/2010/main" val="453743735"/>
       </p:ext>
     </p:extLst>
   </p:cSld>

</xml_diff>